<commit_message>
Presentation updated with example 6
</commit_message>
<xml_diff>
--- a/doc/GOLANG-Q-A.pptx
+++ b/doc/GOLANG-Q-A.pptx
@@ -5,17 +5,17 @@
     <p:sldMasterId id="2147483696" r:id="rId4"/>
   </p:sldMasterIdLst>
   <p:notesMasterIdLst>
-    <p:notesMasterId r:id="rId44"/>
+    <p:notesMasterId r:id="rId46"/>
   </p:notesMasterIdLst>
   <p:sldIdLst>
     <p:sldId id="306" r:id="rId5"/>
     <p:sldId id="307" r:id="rId6"/>
     <p:sldId id="309" r:id="rId7"/>
     <p:sldId id="304" r:id="rId8"/>
-    <p:sldId id="346" r:id="rId9"/>
-    <p:sldId id="314" r:id="rId10"/>
-    <p:sldId id="313" r:id="rId11"/>
-    <p:sldId id="347" r:id="rId12"/>
+    <p:sldId id="347" r:id="rId9"/>
+    <p:sldId id="346" r:id="rId10"/>
+    <p:sldId id="314" r:id="rId11"/>
+    <p:sldId id="313" r:id="rId12"/>
     <p:sldId id="315" r:id="rId13"/>
     <p:sldId id="348" r:id="rId14"/>
     <p:sldId id="318" r:id="rId15"/>
@@ -43,10 +43,12 @@
     <p:sldId id="337" r:id="rId37"/>
     <p:sldId id="351" r:id="rId38"/>
     <p:sldId id="352" r:id="rId39"/>
-    <p:sldId id="326" r:id="rId40"/>
-    <p:sldId id="345" r:id="rId41"/>
-    <p:sldId id="353" r:id="rId42"/>
-    <p:sldId id="312" r:id="rId43"/>
+    <p:sldId id="358" r:id="rId40"/>
+    <p:sldId id="359" r:id="rId41"/>
+    <p:sldId id="326" r:id="rId42"/>
+    <p:sldId id="345" r:id="rId43"/>
+    <p:sldId id="353" r:id="rId44"/>
+    <p:sldId id="312" r:id="rId45"/>
   </p:sldIdLst>
   <p:sldSz cx="12192000" cy="6858000"/>
   <p:notesSz cx="6858000" cy="9144000"/>
@@ -178,7 +180,7 @@
 <file path=ppt/revisionInfo.xml><?xml version="1.0" encoding="utf-8"?>
 <p1510:revInfo xmlns:a="http://schemas.openxmlformats.org/drawingml/2006/main" xmlns:r="http://schemas.openxmlformats.org/officeDocument/2006/relationships" xmlns:p1510="http://schemas.microsoft.com/office/powerpoint/2015/10/main">
   <p1510:revLst>
-    <p1510:client id="{BA75E305-BCCA-46B8-BDA7-E0B075DE28D0}" v="27" dt="2023-11-22T16:30:05.209"/>
+    <p1510:client id="{BA75E305-BCCA-46B8-BDA7-E0B075DE28D0}" v="29" dt="2023-11-23T10:59:04.307"/>
   </p1510:revLst>
 </p1510:revInfo>
 </file>
@@ -188,12 +190,12 @@
   <pc:docChgLst>
     <pc:chgData name="Bondarczuk, Norbert (CW)" userId="828710be-d584-49cf-b413-d10447949189" providerId="ADAL" clId="{BA75E305-BCCA-46B8-BDA7-E0B075DE28D0}"/>
     <pc:docChg chg="custSel addSld delSld modSld sldOrd">
-      <pc:chgData name="Bondarczuk, Norbert (CW)" userId="828710be-d584-49cf-b413-d10447949189" providerId="ADAL" clId="{BA75E305-BCCA-46B8-BDA7-E0B075DE28D0}" dt="2023-11-22T16:35:02.953" v="15272" actId="20577"/>
+      <pc:chgData name="Bondarczuk, Norbert (CW)" userId="828710be-d584-49cf-b413-d10447949189" providerId="ADAL" clId="{BA75E305-BCCA-46B8-BDA7-E0B075DE28D0}" dt="2023-11-23T11:06:17.974" v="15507"/>
       <pc:docMkLst>
         <pc:docMk/>
       </pc:docMkLst>
       <pc:sldChg chg="addSp delSp modSp mod">
-        <pc:chgData name="Bondarczuk, Norbert (CW)" userId="828710be-d584-49cf-b413-d10447949189" providerId="ADAL" clId="{BA75E305-BCCA-46B8-BDA7-E0B075DE28D0}" dt="2023-11-21T13:29:26.851" v="13059" actId="20577"/>
+        <pc:chgData name="Bondarczuk, Norbert (CW)" userId="828710be-d584-49cf-b413-d10447949189" providerId="ADAL" clId="{BA75E305-BCCA-46B8-BDA7-E0B075DE28D0}" dt="2023-11-23T11:04:27.583" v="15501" actId="27636"/>
         <pc:sldMkLst>
           <pc:docMk/>
           <pc:sldMk cId="3124766000" sldId="304"/>
@@ -207,7 +209,7 @@
           </ac:spMkLst>
         </pc:spChg>
         <pc:spChg chg="add del mod">
-          <ac:chgData name="Bondarczuk, Norbert (CW)" userId="828710be-d584-49cf-b413-d10447949189" providerId="ADAL" clId="{BA75E305-BCCA-46B8-BDA7-E0B075DE28D0}" dt="2023-11-21T13:29:26.851" v="13059" actId="20577"/>
+          <ac:chgData name="Bondarczuk, Norbert (CW)" userId="828710be-d584-49cf-b413-d10447949189" providerId="ADAL" clId="{BA75E305-BCCA-46B8-BDA7-E0B075DE28D0}" dt="2023-11-23T11:04:27.583" v="15501" actId="27636"/>
           <ac:spMkLst>
             <pc:docMk/>
             <pc:sldMk cId="3124766000" sldId="304"/>
@@ -247,13 +249,13 @@
         </pc:spChg>
       </pc:sldChg>
       <pc:sldChg chg="modSp mod">
-        <pc:chgData name="Bondarczuk, Norbert (CW)" userId="828710be-d584-49cf-b413-d10447949189" providerId="ADAL" clId="{BA75E305-BCCA-46B8-BDA7-E0B075DE28D0}" dt="2023-11-22T16:30:54.582" v="15156" actId="20577"/>
+        <pc:chgData name="Bondarczuk, Norbert (CW)" userId="828710be-d584-49cf-b413-d10447949189" providerId="ADAL" clId="{BA75E305-BCCA-46B8-BDA7-E0B075DE28D0}" dt="2023-11-23T11:03:59.097" v="15473" actId="20577"/>
         <pc:sldMkLst>
           <pc:docMk/>
           <pc:sldMk cId="1613598062" sldId="307"/>
         </pc:sldMkLst>
         <pc:spChg chg="mod">
-          <ac:chgData name="Bondarczuk, Norbert (CW)" userId="828710be-d584-49cf-b413-d10447949189" providerId="ADAL" clId="{BA75E305-BCCA-46B8-BDA7-E0B075DE28D0}" dt="2023-11-22T16:30:54.582" v="15156" actId="20577"/>
+          <ac:chgData name="Bondarczuk, Norbert (CW)" userId="828710be-d584-49cf-b413-d10447949189" providerId="ADAL" clId="{BA75E305-BCCA-46B8-BDA7-E0B075DE28D0}" dt="2023-11-23T11:03:59.097" v="15473" actId="20577"/>
           <ac:spMkLst>
             <pc:docMk/>
             <pc:sldMk cId="1613598062" sldId="307"/>
@@ -897,8 +899,8 @@
           </ac:spMkLst>
         </pc:spChg>
       </pc:sldChg>
-      <pc:sldChg chg="addSp delSp modSp add mod">
-        <pc:chgData name="Bondarczuk, Norbert (CW)" userId="828710be-d584-49cf-b413-d10447949189" providerId="ADAL" clId="{BA75E305-BCCA-46B8-BDA7-E0B075DE28D0}" dt="2023-11-20T11:25:35.354" v="10754" actId="21"/>
+      <pc:sldChg chg="addSp delSp modSp add mod ord">
+        <pc:chgData name="Bondarczuk, Norbert (CW)" userId="828710be-d584-49cf-b413-d10447949189" providerId="ADAL" clId="{BA75E305-BCCA-46B8-BDA7-E0B075DE28D0}" dt="2023-11-23T11:06:17.974" v="15507"/>
         <pc:sldMkLst>
           <pc:docMk/>
           <pc:sldMk cId="1682619705" sldId="347"/>
@@ -1230,6 +1232,76 @@
           </ac:spMkLst>
         </pc:spChg>
       </pc:sldChg>
+      <pc:sldChg chg="modSp add mod">
+        <pc:chgData name="Bondarczuk, Norbert (CW)" userId="828710be-d584-49cf-b413-d10447949189" providerId="ADAL" clId="{BA75E305-BCCA-46B8-BDA7-E0B075DE28D0}" dt="2023-11-23T11:03:43.881" v="15468" actId="20577"/>
+        <pc:sldMkLst>
+          <pc:docMk/>
+          <pc:sldMk cId="1959607631" sldId="358"/>
+        </pc:sldMkLst>
+        <pc:spChg chg="mod">
+          <ac:chgData name="Bondarczuk, Norbert (CW)" userId="828710be-d584-49cf-b413-d10447949189" providerId="ADAL" clId="{BA75E305-BCCA-46B8-BDA7-E0B075DE28D0}" dt="2023-11-23T11:03:43.881" v="15468" actId="20577"/>
+          <ac:spMkLst>
+            <pc:docMk/>
+            <pc:sldMk cId="1959607631" sldId="358"/>
+            <ac:spMk id="2" creationId="{C5F2FB0B-15EC-453B-BC9B-69AD35DDCEA3}"/>
+          </ac:spMkLst>
+        </pc:spChg>
+        <pc:spChg chg="mod">
+          <ac:chgData name="Bondarczuk, Norbert (CW)" userId="828710be-d584-49cf-b413-d10447949189" providerId="ADAL" clId="{BA75E305-BCCA-46B8-BDA7-E0B075DE28D0}" dt="2023-11-23T11:03:29.648" v="15462" actId="20577"/>
+          <ac:spMkLst>
+            <pc:docMk/>
+            <pc:sldMk cId="1959607631" sldId="358"/>
+            <ac:spMk id="3" creationId="{05408798-0DB3-46BF-880E-7BB904D700F6}"/>
+          </ac:spMkLst>
+        </pc:spChg>
+      </pc:sldChg>
+      <pc:sldChg chg="addSp delSp modSp add mod">
+        <pc:chgData name="Bondarczuk, Norbert (CW)" userId="828710be-d584-49cf-b413-d10447949189" providerId="ADAL" clId="{BA75E305-BCCA-46B8-BDA7-E0B075DE28D0}" dt="2023-11-23T11:02:23.802" v="15444"/>
+        <pc:sldMkLst>
+          <pc:docMk/>
+          <pc:sldMk cId="345003730" sldId="359"/>
+        </pc:sldMkLst>
+        <pc:spChg chg="mod">
+          <ac:chgData name="Bondarczuk, Norbert (CW)" userId="828710be-d584-49cf-b413-d10447949189" providerId="ADAL" clId="{BA75E305-BCCA-46B8-BDA7-E0B075DE28D0}" dt="2023-11-23T11:01:44.806" v="15442" actId="20577"/>
+          <ac:spMkLst>
+            <pc:docMk/>
+            <pc:sldMk cId="345003730" sldId="359"/>
+            <ac:spMk id="2" creationId="{CFACDA59-55A0-4EA5-B3E4-646D1D3B4CEB}"/>
+          </ac:spMkLst>
+        </pc:spChg>
+        <pc:spChg chg="add del mod">
+          <ac:chgData name="Bondarczuk, Norbert (CW)" userId="828710be-d584-49cf-b413-d10447949189" providerId="ADAL" clId="{BA75E305-BCCA-46B8-BDA7-E0B075DE28D0}" dt="2023-11-23T11:01:15.956" v="15425" actId="22"/>
+          <ac:spMkLst>
+            <pc:docMk/>
+            <pc:sldMk cId="345003730" sldId="359"/>
+            <ac:spMk id="5" creationId="{462613AC-EBB7-FFF9-3689-4FF69AEB3DB7}"/>
+          </ac:spMkLst>
+        </pc:spChg>
+        <pc:spChg chg="mod">
+          <ac:chgData name="Bondarczuk, Norbert (CW)" userId="828710be-d584-49cf-b413-d10447949189" providerId="ADAL" clId="{BA75E305-BCCA-46B8-BDA7-E0B075DE28D0}" dt="2023-11-23T11:02:23.802" v="15444"/>
+          <ac:spMkLst>
+            <pc:docMk/>
+            <pc:sldMk cId="345003730" sldId="359"/>
+            <ac:spMk id="7" creationId="{991AB68B-38B0-3134-EC86-278418DF2FEA}"/>
+          </ac:spMkLst>
+        </pc:spChg>
+        <pc:picChg chg="del">
+          <ac:chgData name="Bondarczuk, Norbert (CW)" userId="828710be-d584-49cf-b413-d10447949189" providerId="ADAL" clId="{BA75E305-BCCA-46B8-BDA7-E0B075DE28D0}" dt="2023-11-23T10:59:48.061" v="15423" actId="478"/>
+          <ac:picMkLst>
+            <pc:docMk/>
+            <pc:sldMk cId="345003730" sldId="359"/>
+            <ac:picMk id="4" creationId="{06279856-F563-11A1-1C63-ECEE4270C436}"/>
+          </ac:picMkLst>
+        </pc:picChg>
+        <pc:picChg chg="add mod ord">
+          <ac:chgData name="Bondarczuk, Norbert (CW)" userId="828710be-d584-49cf-b413-d10447949189" providerId="ADAL" clId="{BA75E305-BCCA-46B8-BDA7-E0B075DE28D0}" dt="2023-11-23T11:01:26.151" v="15427" actId="1076"/>
+          <ac:picMkLst>
+            <pc:docMk/>
+            <pc:sldMk cId="345003730" sldId="359"/>
+            <ac:picMk id="8" creationId="{C8447DE3-2805-893A-3C2C-7CC513256D02}"/>
+          </ac:picMkLst>
+        </pc:picChg>
+      </pc:sldChg>
     </pc:docChg>
   </pc:docChgLst>
 </pc:chgInfo>
@@ -1317,7 +1389,7 @@
           <a:p>
             <a:fld id="{5EA28068-AFBD-4979-B752-9EB6F90B1386}" type="datetimeFigureOut">
               <a:rPr lang="en-US" smtClean="0"/>
-              <a:t>11/22/2023</a:t>
+              <a:t>11/23/2023</a:t>
             </a:fld>
             <a:endParaRPr lang="en-US" dirty="0"/>
           </a:p>
@@ -14084,6 +14156,17 @@
             </a:r>
           </a:p>
           <a:p>
+            <a:r>
+              <a:rPr lang="en-US" dirty="0"/>
+              <a:t>MORE COMPLEX PROJECT STRUCTURES</a:t>
+            </a:r>
+            <a:endParaRPr lang="en-US" sz="1800" dirty="0">
+              <a:solidFill>
+                <a:schemeClr val="bg1"/>
+              </a:solidFill>
+            </a:endParaRPr>
+          </a:p>
+          <a:p>
             <a:pPr algn="r"/>
             <a:r>
               <a:rPr lang="en-US" sz="1800" dirty="0">
@@ -17309,7 +17392,7 @@
                   <a:schemeClr val="bg1"/>
                 </a:solidFill>
               </a:rPr>
-              <a:t>QUESTION AND ANSWERS</a:t>
+              <a:t>MORE COMPLEX PROJECT STRUCTURES</a:t>
             </a:r>
             <a:br>
               <a:rPr lang="en-US" sz="6000" dirty="0">
@@ -17352,13 +17435,7 @@
           <a:p>
             <a:r>
               <a:rPr lang="en-US" dirty="0"/>
-              <a:t>Go proverbs – quiz</a:t>
-            </a:r>
-          </a:p>
-          <a:p>
-            <a:r>
-              <a:rPr lang="en-US" dirty="0"/>
-              <a:t>Examples for workshop</a:t>
+              <a:t>Imaginary Go bank  API project</a:t>
             </a:r>
           </a:p>
         </p:txBody>
@@ -17366,7 +17443,7 @@
     </p:spTree>
     <p:extLst>
       <p:ext uri="{BB962C8B-B14F-4D97-AF65-F5344CB8AC3E}">
-        <p14:creationId xmlns:p14="http://schemas.microsoft.com/office/powerpoint/2010/main" val="2748183101"/>
+        <p14:creationId xmlns:p14="http://schemas.microsoft.com/office/powerpoint/2010/main" val="1959607631"/>
       </p:ext>
     </p:extLst>
   </p:cSld>
@@ -17412,165 +17489,295 @@
         <p:spPr/>
         <p:txBody>
           <a:bodyPr>
+            <a:normAutofit fontScale="90000"/>
+          </a:bodyPr>
+          <a:lstStyle/>
+          <a:p>
+            <a:r>
+              <a:rPr lang="en-US" dirty="0"/>
+              <a:t>Example of an imaginary bank API</a:t>
+            </a:r>
+            <a:endParaRPr lang="en-US" sz="5400" dirty="0"/>
+          </a:p>
+        </p:txBody>
+      </p:sp>
+      <p:sp>
+        <p:nvSpPr>
+          <p:cNvPr id="7" name="Content Placeholder 2">
+            <a:extLst>
+              <a:ext uri="{FF2B5EF4-FFF2-40B4-BE49-F238E27FC236}">
+                <a16:creationId xmlns:a16="http://schemas.microsoft.com/office/drawing/2014/main" id="{991AB68B-38B0-3134-EC86-278418DF2FEA}"/>
+              </a:ext>
+            </a:extLst>
+          </p:cNvPr>
+          <p:cNvSpPr txBox="1">
+            <a:spLocks/>
+          </p:cNvSpPr>
+          <p:nvPr/>
+        </p:nvSpPr>
+        <p:spPr>
+          <a:xfrm>
+            <a:off x="838200" y="1825625"/>
+            <a:ext cx="5785757" cy="4215946"/>
+          </a:xfrm>
+          <a:prstGeom prst="rect">
+            <a:avLst/>
+          </a:prstGeom>
+        </p:spPr>
+        <p:txBody>
+          <a:bodyPr vert="horz" lIns="91440" tIns="45720" rIns="91440" bIns="45720" rtlCol="0">
             <a:normAutofit/>
           </a:bodyPr>
-          <a:lstStyle/>
-          <a:p>
-            <a:r>
-              <a:rPr lang="en-US" dirty="0"/>
-              <a:t>Go proverbs - quiz</a:t>
-            </a:r>
-            <a:endParaRPr lang="en-US" sz="5400" dirty="0"/>
-          </a:p>
-        </p:txBody>
-      </p:sp>
-      <p:sp>
-        <p:nvSpPr>
-          <p:cNvPr id="15" name="Content Placeholder 14">
-            <a:extLst>
-              <a:ext uri="{FF2B5EF4-FFF2-40B4-BE49-F238E27FC236}">
-                <a16:creationId xmlns:a16="http://schemas.microsoft.com/office/drawing/2014/main" id="{0DE4AC6A-3FAF-881B-86DE-A0BFC3B4250F}"/>
-              </a:ext>
-            </a:extLst>
-          </p:cNvPr>
-          <p:cNvSpPr>
-            <a:spLocks noGrp="1"/>
-          </p:cNvSpPr>
+          <a:lstStyle>
+            <a:lvl1pPr marL="228600" indent="-228600" algn="l" defTabSz="914400" rtl="0" eaLnBrk="1" latinLnBrk="0" hangingPunct="1">
+              <a:lnSpc>
+                <a:spcPct val="90000"/>
+              </a:lnSpc>
+              <a:spcBef>
+                <a:spcPts val="1000"/>
+              </a:spcBef>
+              <a:buFont typeface="Arial" panose="020B0604020202020204" pitchFamily="34" charset="0"/>
+              <a:buChar char="•"/>
+              <a:defRPr sz="2800" kern="1200">
+                <a:solidFill>
+                  <a:schemeClr val="tx1"/>
+                </a:solidFill>
+                <a:latin typeface="+mn-lt"/>
+                <a:ea typeface="+mn-ea"/>
+                <a:cs typeface="+mn-cs"/>
+              </a:defRPr>
+            </a:lvl1pPr>
+            <a:lvl2pPr marL="685800" indent="-228600" algn="l" defTabSz="914400" rtl="0" eaLnBrk="1" latinLnBrk="0" hangingPunct="1">
+              <a:lnSpc>
+                <a:spcPct val="90000"/>
+              </a:lnSpc>
+              <a:spcBef>
+                <a:spcPts val="500"/>
+              </a:spcBef>
+              <a:buFont typeface="Arial" panose="020B0604020202020204" pitchFamily="34" charset="0"/>
+              <a:buChar char="•"/>
+              <a:defRPr sz="2400" kern="1200">
+                <a:solidFill>
+                  <a:schemeClr val="tx1"/>
+                </a:solidFill>
+                <a:latin typeface="+mn-lt"/>
+                <a:ea typeface="+mn-ea"/>
+                <a:cs typeface="+mn-cs"/>
+              </a:defRPr>
+            </a:lvl2pPr>
+            <a:lvl3pPr marL="1143000" indent="-228600" algn="l" defTabSz="914400" rtl="0" eaLnBrk="1" latinLnBrk="0" hangingPunct="1">
+              <a:lnSpc>
+                <a:spcPct val="90000"/>
+              </a:lnSpc>
+              <a:spcBef>
+                <a:spcPts val="500"/>
+              </a:spcBef>
+              <a:buFont typeface="Arial" panose="020B0604020202020204" pitchFamily="34" charset="0"/>
+              <a:buChar char="•"/>
+              <a:defRPr sz="2000" kern="1200">
+                <a:solidFill>
+                  <a:schemeClr val="tx1"/>
+                </a:solidFill>
+                <a:latin typeface="+mn-lt"/>
+                <a:ea typeface="+mn-ea"/>
+                <a:cs typeface="+mn-cs"/>
+              </a:defRPr>
+            </a:lvl3pPr>
+            <a:lvl4pPr marL="1600200" indent="-228600" algn="l" defTabSz="914400" rtl="0" eaLnBrk="1" latinLnBrk="0" hangingPunct="1">
+              <a:lnSpc>
+                <a:spcPct val="90000"/>
+              </a:lnSpc>
+              <a:spcBef>
+                <a:spcPts val="500"/>
+              </a:spcBef>
+              <a:buFont typeface="Arial" panose="020B0604020202020204" pitchFamily="34" charset="0"/>
+              <a:buChar char="•"/>
+              <a:defRPr sz="1800" kern="1200">
+                <a:solidFill>
+                  <a:schemeClr val="tx1"/>
+                </a:solidFill>
+                <a:latin typeface="+mn-lt"/>
+                <a:ea typeface="+mn-ea"/>
+                <a:cs typeface="+mn-cs"/>
+              </a:defRPr>
+            </a:lvl4pPr>
+            <a:lvl5pPr marL="2057400" indent="-228600" algn="l" defTabSz="914400" rtl="0" eaLnBrk="1" latinLnBrk="0" hangingPunct="1">
+              <a:lnSpc>
+                <a:spcPct val="90000"/>
+              </a:lnSpc>
+              <a:spcBef>
+                <a:spcPts val="500"/>
+              </a:spcBef>
+              <a:buFont typeface="Arial" panose="020B0604020202020204" pitchFamily="34" charset="0"/>
+              <a:buChar char="•"/>
+              <a:defRPr sz="1800" kern="1200">
+                <a:solidFill>
+                  <a:schemeClr val="tx1"/>
+                </a:solidFill>
+                <a:latin typeface="+mn-lt"/>
+                <a:ea typeface="+mn-ea"/>
+                <a:cs typeface="+mn-cs"/>
+              </a:defRPr>
+            </a:lvl5pPr>
+            <a:lvl6pPr marL="2514600" indent="-228600" algn="l" defTabSz="914400" rtl="0" eaLnBrk="1" latinLnBrk="0" hangingPunct="1">
+              <a:lnSpc>
+                <a:spcPct val="90000"/>
+              </a:lnSpc>
+              <a:spcBef>
+                <a:spcPts val="500"/>
+              </a:spcBef>
+              <a:buFont typeface="Arial" panose="020B0604020202020204" pitchFamily="34" charset="0"/>
+              <a:buChar char="•"/>
+              <a:defRPr sz="1800" kern="1200">
+                <a:solidFill>
+                  <a:schemeClr val="tx1"/>
+                </a:solidFill>
+                <a:latin typeface="+mn-lt"/>
+                <a:ea typeface="+mn-ea"/>
+                <a:cs typeface="+mn-cs"/>
+              </a:defRPr>
+            </a:lvl6pPr>
+            <a:lvl7pPr marL="2971800" indent="-228600" algn="l" defTabSz="914400" rtl="0" eaLnBrk="1" latinLnBrk="0" hangingPunct="1">
+              <a:lnSpc>
+                <a:spcPct val="90000"/>
+              </a:lnSpc>
+              <a:spcBef>
+                <a:spcPts val="500"/>
+              </a:spcBef>
+              <a:buFont typeface="Arial" panose="020B0604020202020204" pitchFamily="34" charset="0"/>
+              <a:buChar char="•"/>
+              <a:defRPr sz="1800" kern="1200">
+                <a:solidFill>
+                  <a:schemeClr val="tx1"/>
+                </a:solidFill>
+                <a:latin typeface="+mn-lt"/>
+                <a:ea typeface="+mn-ea"/>
+                <a:cs typeface="+mn-cs"/>
+              </a:defRPr>
+            </a:lvl7pPr>
+            <a:lvl8pPr marL="3429000" indent="-228600" algn="l" defTabSz="914400" rtl="0" eaLnBrk="1" latinLnBrk="0" hangingPunct="1">
+              <a:lnSpc>
+                <a:spcPct val="90000"/>
+              </a:lnSpc>
+              <a:spcBef>
+                <a:spcPts val="500"/>
+              </a:spcBef>
+              <a:buFont typeface="Arial" panose="020B0604020202020204" pitchFamily="34" charset="0"/>
+              <a:buChar char="•"/>
+              <a:defRPr sz="1800" kern="1200">
+                <a:solidFill>
+                  <a:schemeClr val="tx1"/>
+                </a:solidFill>
+                <a:latin typeface="+mn-lt"/>
+                <a:ea typeface="+mn-ea"/>
+                <a:cs typeface="+mn-cs"/>
+              </a:defRPr>
+            </a:lvl8pPr>
+            <a:lvl9pPr marL="3886200" indent="-228600" algn="l" defTabSz="914400" rtl="0" eaLnBrk="1" latinLnBrk="0" hangingPunct="1">
+              <a:lnSpc>
+                <a:spcPct val="90000"/>
+              </a:lnSpc>
+              <a:spcBef>
+                <a:spcPts val="500"/>
+              </a:spcBef>
+              <a:buFont typeface="Arial" panose="020B0604020202020204" pitchFamily="34" charset="0"/>
+              <a:buChar char="•"/>
+              <a:defRPr sz="1800" kern="1200">
+                <a:solidFill>
+                  <a:schemeClr val="tx1"/>
+                </a:solidFill>
+                <a:latin typeface="+mn-lt"/>
+                <a:ea typeface="+mn-ea"/>
+                <a:cs typeface="+mn-cs"/>
+              </a:defRPr>
+            </a:lvl9pPr>
+          </a:lstStyle>
+          <a:p>
+            <a:r>
+              <a:rPr lang="en-US" dirty="0"/>
+              <a:t>This is an example of more complex project structure</a:t>
+            </a:r>
+          </a:p>
+          <a:p>
+            <a:r>
+              <a:rPr lang="en-US" dirty="0" err="1">
+                <a:hlinkClick r:id="rId2"/>
+              </a:rPr>
+              <a:t>golang</a:t>
+            </a:r>
+            <a:r>
+              <a:rPr lang="en-US" dirty="0">
+                <a:hlinkClick r:id="rId2"/>
+              </a:rPr>
+              <a:t>-q-a/examples/6 at main · </a:t>
+            </a:r>
+            <a:r>
+              <a:rPr lang="en-US" dirty="0" err="1">
+                <a:hlinkClick r:id="rId2"/>
+              </a:rPr>
+              <a:t>nbondarczuk</a:t>
+            </a:r>
+            <a:r>
+              <a:rPr lang="en-US" dirty="0">
+                <a:hlinkClick r:id="rId2"/>
+              </a:rPr>
+              <a:t>/</a:t>
+            </a:r>
+            <a:r>
+              <a:rPr lang="en-US" dirty="0" err="1">
+                <a:hlinkClick r:id="rId2"/>
+              </a:rPr>
+              <a:t>golang</a:t>
+            </a:r>
+            <a:r>
+              <a:rPr lang="en-US" dirty="0">
+                <a:hlinkClick r:id="rId2"/>
+              </a:rPr>
+              <a:t>-q-a · GitHub</a:t>
+            </a:r>
+            <a:endParaRPr lang="en-US" dirty="0"/>
+          </a:p>
+          <a:p>
+            <a:endParaRPr lang="en-US" dirty="0"/>
+          </a:p>
+          <a:p>
+            <a:endParaRPr lang="en-US" dirty="0"/>
+          </a:p>
+        </p:txBody>
+      </p:sp>
+      <p:pic>
+        <p:nvPicPr>
+          <p:cNvPr id="8" name="Content Placeholder 7">
+            <a:extLst>
+              <a:ext uri="{FF2B5EF4-FFF2-40B4-BE49-F238E27FC236}">
+                <a16:creationId xmlns:a16="http://schemas.microsoft.com/office/drawing/2014/main" id="{C8447DE3-2805-893A-3C2C-7CC513256D02}"/>
+              </a:ext>
+            </a:extLst>
+          </p:cNvPr>
+          <p:cNvPicPr>
+            <a:picLocks noGrp="1" noChangeAspect="1"/>
+          </p:cNvPicPr>
           <p:nvPr>
             <p:ph idx="1"/>
           </p:nvPr>
-        </p:nvSpPr>
-        <p:spPr/>
-        <p:txBody>
-          <a:bodyPr>
-            <a:normAutofit fontScale="85000" lnSpcReduction="20000"/>
-          </a:bodyPr>
-          <a:lstStyle/>
-          <a:p>
-            <a:pPr lvl="1"/>
-            <a:r>
-              <a:rPr lang="en-US" dirty="0"/>
-              <a:t>Errors are values.</a:t>
-            </a:r>
-          </a:p>
-          <a:p>
-            <a:pPr lvl="1"/>
-            <a:r>
-              <a:rPr lang="en-US" dirty="0"/>
-              <a:t>Don’t just check errors, handle them gracefully.</a:t>
-            </a:r>
-          </a:p>
-          <a:p>
-            <a:pPr lvl="1"/>
-            <a:r>
-              <a:rPr lang="en-US" dirty="0"/>
-              <a:t>Don’t panic.</a:t>
-            </a:r>
-          </a:p>
-          <a:p>
-            <a:pPr lvl="1"/>
-            <a:r>
-              <a:rPr lang="en-US" dirty="0"/>
-              <a:t>Make the zero value useful.</a:t>
-            </a:r>
-          </a:p>
-          <a:p>
-            <a:pPr lvl="1"/>
-            <a:r>
-              <a:rPr lang="en-US" dirty="0"/>
-              <a:t>The bigger the interface, the weaker the abstraction.</a:t>
-            </a:r>
-          </a:p>
-          <a:p>
-            <a:pPr lvl="1"/>
-            <a:r>
-              <a:rPr lang="en-US" dirty="0"/>
-              <a:t>interface{} says nothing.</a:t>
-            </a:r>
-          </a:p>
-          <a:p>
-            <a:pPr lvl="1"/>
-            <a:r>
-              <a:rPr lang="en-US" dirty="0" err="1"/>
-              <a:t>Gofmt’s</a:t>
-            </a:r>
-            <a:r>
-              <a:rPr lang="en-US" dirty="0"/>
-              <a:t> style is no one’s favorite, yet </a:t>
-            </a:r>
-            <a:r>
-              <a:rPr lang="en-US" dirty="0" err="1"/>
-              <a:t>gofmt</a:t>
-            </a:r>
-            <a:r>
-              <a:rPr lang="en-US" dirty="0"/>
-              <a:t> is everyone’s favorite.</a:t>
-            </a:r>
-          </a:p>
-          <a:p>
-            <a:pPr lvl="1"/>
-            <a:r>
-              <a:rPr lang="en-US" dirty="0"/>
-              <a:t>Documentation is for users.</a:t>
-            </a:r>
-          </a:p>
-          <a:p>
-            <a:pPr lvl="1"/>
-            <a:r>
-              <a:rPr lang="en-US" dirty="0"/>
-              <a:t>A little copying is better than a little dependency.</a:t>
-            </a:r>
-          </a:p>
-          <a:p>
-            <a:pPr lvl="1"/>
-            <a:r>
-              <a:rPr lang="en-US" dirty="0"/>
-              <a:t>Clear is better than clever.</a:t>
-            </a:r>
-          </a:p>
-          <a:p>
-            <a:pPr lvl="1"/>
-            <a:r>
-              <a:rPr lang="en-US" dirty="0"/>
-              <a:t>Concurrency is not parallelism.</a:t>
-            </a:r>
-          </a:p>
-          <a:p>
-            <a:pPr lvl="1"/>
-            <a:r>
-              <a:rPr lang="en-US" dirty="0"/>
-              <a:t>Don’t communicate by sharing memory, share memory by communicating.</a:t>
-            </a:r>
-          </a:p>
-          <a:p>
-            <a:pPr lvl="1"/>
-            <a:r>
-              <a:rPr lang="en-US" dirty="0"/>
-              <a:t>Channels orchestrate; mutexes serialize.</a:t>
-            </a:r>
-          </a:p>
-          <a:p>
-            <a:pPr lvl="1"/>
-            <a:endParaRPr lang="en-US" dirty="0"/>
-          </a:p>
-          <a:p>
-            <a:pPr marL="457200" lvl="1" indent="0">
-              <a:buNone/>
-            </a:pPr>
-            <a:r>
-              <a:rPr lang="en-US" dirty="0"/>
-              <a:t>Rob Pike, Go Proverbs (see go-proverbs.github.io)”</a:t>
-            </a:r>
-          </a:p>
-          <a:p>
-            <a:endParaRPr lang="en-US" dirty="0"/>
-          </a:p>
-        </p:txBody>
-      </p:sp>
+        </p:nvPicPr>
+        <p:blipFill>
+          <a:blip r:embed="rId3"/>
+          <a:stretch>
+            <a:fillRect/>
+          </a:stretch>
+        </p:blipFill>
+        <p:spPr>
+          <a:xfrm>
+            <a:off x="8097712" y="1690233"/>
+            <a:ext cx="2286834" cy="4351338"/>
+          </a:xfrm>
+        </p:spPr>
+      </p:pic>
     </p:spTree>
     <p:extLst>
       <p:ext uri="{BB962C8B-B14F-4D97-AF65-F5344CB8AC3E}">
-        <p14:creationId xmlns:p14="http://schemas.microsoft.com/office/powerpoint/2010/main" val="3184894582"/>
+        <p14:creationId xmlns:p14="http://schemas.microsoft.com/office/powerpoint/2010/main" val="345003730"/>
       </p:ext>
     </p:extLst>
   </p:cSld>
@@ -17602,7 +17809,7 @@
           <p:cNvPr id="2" name="Title 1">
             <a:extLst>
               <a:ext uri="{FF2B5EF4-FFF2-40B4-BE49-F238E27FC236}">
-                <a16:creationId xmlns:a16="http://schemas.microsoft.com/office/drawing/2014/main" id="{CFACDA59-55A0-4EA5-B3E4-646D1D3B4CEB}"/>
+                <a16:creationId xmlns:a16="http://schemas.microsoft.com/office/drawing/2014/main" id="{C5F2FB0B-15EC-453B-BC9B-69AD35DDCEA3}"/>
               </a:ext>
             </a:extLst>
           </p:cNvPr>
@@ -17610,10 +17817,57 @@
             <a:spLocks noGrp="1"/>
           </p:cNvSpPr>
           <p:nvPr>
-            <p:ph type="title"/>
+            <p:ph type="ctrTitle"/>
           </p:nvPr>
         </p:nvSpPr>
         <p:spPr/>
+        <p:txBody>
+          <a:bodyPr>
+            <a:normAutofit fontScale="90000"/>
+          </a:bodyPr>
+          <a:lstStyle/>
+          <a:p>
+            <a:r>
+              <a:rPr lang="en-US" sz="6000" dirty="0">
+                <a:solidFill>
+                  <a:schemeClr val="bg1"/>
+                </a:solidFill>
+              </a:rPr>
+              <a:t>QUESTION AND ANSWERS</a:t>
+            </a:r>
+            <a:br>
+              <a:rPr lang="en-US" sz="6000" dirty="0">
+                <a:solidFill>
+                  <a:schemeClr val="bg1"/>
+                </a:solidFill>
+              </a:rPr>
+            </a:br>
+            <a:endParaRPr lang="en-US" dirty="0"/>
+          </a:p>
+        </p:txBody>
+      </p:sp>
+      <p:sp>
+        <p:nvSpPr>
+          <p:cNvPr id="3" name="Subtitle 2">
+            <a:extLst>
+              <a:ext uri="{FF2B5EF4-FFF2-40B4-BE49-F238E27FC236}">
+                <a16:creationId xmlns:a16="http://schemas.microsoft.com/office/drawing/2014/main" id="{05408798-0DB3-46BF-880E-7BB904D700F6}"/>
+              </a:ext>
+            </a:extLst>
+          </p:cNvPr>
+          <p:cNvSpPr>
+            <a:spLocks noGrp="1"/>
+          </p:cNvSpPr>
+          <p:nvPr>
+            <p:ph type="subTitle" idx="1"/>
+          </p:nvPr>
+        </p:nvSpPr>
+        <p:spPr>
+          <a:xfrm>
+            <a:off x="1527048" y="3858767"/>
+            <a:ext cx="9144000" cy="2752097"/>
+          </a:xfrm>
+        </p:spPr>
         <p:txBody>
           <a:bodyPr>
             <a:normAutofit/>
@@ -17622,83 +17876,21 @@
           <a:p>
             <a:r>
               <a:rPr lang="en-US" dirty="0"/>
-              <a:t>Code examples for workshop</a:t>
-            </a:r>
-            <a:endParaRPr lang="en-US" sz="5400" dirty="0"/>
-          </a:p>
-        </p:txBody>
-      </p:sp>
-      <p:sp>
-        <p:nvSpPr>
-          <p:cNvPr id="15" name="Content Placeholder 14">
-            <a:extLst>
-              <a:ext uri="{FF2B5EF4-FFF2-40B4-BE49-F238E27FC236}">
-                <a16:creationId xmlns:a16="http://schemas.microsoft.com/office/drawing/2014/main" id="{0DE4AC6A-3FAF-881B-86DE-A0BFC3B4250F}"/>
-              </a:ext>
-            </a:extLst>
-          </p:cNvPr>
-          <p:cNvSpPr>
-            <a:spLocks noGrp="1"/>
-          </p:cNvSpPr>
-          <p:nvPr>
-            <p:ph idx="1"/>
-          </p:nvPr>
-        </p:nvSpPr>
-        <p:spPr/>
-        <p:txBody>
-          <a:bodyPr>
-            <a:normAutofit/>
-          </a:bodyPr>
-          <a:lstStyle/>
-          <a:p>
-            <a:r>
-              <a:rPr lang="en-US" dirty="0"/>
-              <a:t>Available at: </a:t>
-            </a:r>
-            <a:r>
-              <a:rPr lang="en-US" dirty="0" err="1">
-                <a:hlinkClick r:id="rId2"/>
-              </a:rPr>
-              <a:t>golang</a:t>
-            </a:r>
-            <a:r>
-              <a:rPr lang="en-US" dirty="0">
-                <a:hlinkClick r:id="rId2"/>
-              </a:rPr>
-              <a:t>-q-a/examples at main · </a:t>
-            </a:r>
-            <a:r>
-              <a:rPr lang="en-US" dirty="0" err="1">
-                <a:hlinkClick r:id="rId2"/>
-              </a:rPr>
-              <a:t>nbondarczuk</a:t>
-            </a:r>
-            <a:r>
-              <a:rPr lang="en-US" dirty="0">
-                <a:hlinkClick r:id="rId2"/>
-              </a:rPr>
-              <a:t>/</a:t>
-            </a:r>
-            <a:r>
-              <a:rPr lang="en-US" dirty="0" err="1">
-                <a:hlinkClick r:id="rId2"/>
-              </a:rPr>
-              <a:t>golang</a:t>
-            </a:r>
-            <a:r>
-              <a:rPr lang="en-US" dirty="0">
-                <a:hlinkClick r:id="rId2"/>
-              </a:rPr>
-              <a:t>-q-a · GitHub</a:t>
-            </a:r>
-            <a:endParaRPr lang="en-US" dirty="0"/>
+              <a:t>Go proverbs – quiz</a:t>
+            </a:r>
+          </a:p>
+          <a:p>
+            <a:r>
+              <a:rPr lang="en-US" dirty="0"/>
+              <a:t>Examples for workshop</a:t>
+            </a:r>
           </a:p>
         </p:txBody>
       </p:sp>
     </p:spTree>
     <p:extLst>
       <p:ext uri="{BB962C8B-B14F-4D97-AF65-F5344CB8AC3E}">
-        <p14:creationId xmlns:p14="http://schemas.microsoft.com/office/powerpoint/2010/main" val="3384533040"/>
+        <p14:creationId xmlns:p14="http://schemas.microsoft.com/office/powerpoint/2010/main" val="2748183101"/>
       </p:ext>
     </p:extLst>
   </p:cSld>
@@ -17727,142 +17919,10 @@
       </p:grpSpPr>
       <p:sp>
         <p:nvSpPr>
-          <p:cNvPr id="22" name="Date Placeholder 21">
-            <a:extLst>
-              <a:ext uri="{FF2B5EF4-FFF2-40B4-BE49-F238E27FC236}">
-                <a16:creationId xmlns:a16="http://schemas.microsoft.com/office/drawing/2014/main" id="{692474E6-3035-46B8-9C05-9B4204E8ED39}"/>
-              </a:ext>
-            </a:extLst>
-          </p:cNvPr>
-          <p:cNvSpPr>
-            <a:spLocks noGrp="1"/>
-          </p:cNvSpPr>
-          <p:nvPr>
-            <p:ph type="dt" sz="half" idx="10"/>
-          </p:nvPr>
-        </p:nvSpPr>
-        <p:spPr/>
-        <p:txBody>
-          <a:bodyPr/>
-          <a:lstStyle/>
-          <a:p>
-            <a:r>
-              <a:rPr lang="en-US" dirty="0"/>
-              <a:t>28/2/2023</a:t>
-            </a:r>
-          </a:p>
-        </p:txBody>
-      </p:sp>
-      <p:sp>
-        <p:nvSpPr>
-          <p:cNvPr id="24" name="Slide Number Placeholder 23">
-            <a:extLst>
-              <a:ext uri="{FF2B5EF4-FFF2-40B4-BE49-F238E27FC236}">
-                <a16:creationId xmlns:a16="http://schemas.microsoft.com/office/drawing/2014/main" id="{5D838446-B95D-4AB7-B8CA-D5804BB79A11}"/>
-              </a:ext>
-            </a:extLst>
-          </p:cNvPr>
-          <p:cNvSpPr>
-            <a:spLocks noGrp="1"/>
-          </p:cNvSpPr>
-          <p:nvPr>
-            <p:ph type="sldNum" sz="quarter" idx="12"/>
-          </p:nvPr>
-        </p:nvSpPr>
-        <p:spPr/>
-        <p:txBody>
-          <a:bodyPr/>
-          <a:lstStyle/>
-          <a:p>
-            <a:fld id="{D8DA9DAA-006C-4F4B-980E-E3DF019B24E2}" type="slidenum">
-              <a:rPr lang="en-US" smtClean="0"/>
-              <a:pPr/>
-              <a:t>39</a:t>
-            </a:fld>
-            <a:endParaRPr lang="en-US" dirty="0"/>
-          </a:p>
-        </p:txBody>
-      </p:sp>
-      <p:sp>
-        <p:nvSpPr>
-          <p:cNvPr id="23" name="Footer Placeholder 22">
-            <a:extLst>
-              <a:ext uri="{FF2B5EF4-FFF2-40B4-BE49-F238E27FC236}">
-                <a16:creationId xmlns:a16="http://schemas.microsoft.com/office/drawing/2014/main" id="{DE8D546E-0F46-4CC0-B2B1-8B2430D00C0C}"/>
-              </a:ext>
-            </a:extLst>
-          </p:cNvPr>
-          <p:cNvSpPr>
-            <a:spLocks noGrp="1"/>
-          </p:cNvSpPr>
-          <p:nvPr>
-            <p:ph type="ftr" sz="quarter" idx="11"/>
-          </p:nvPr>
-        </p:nvSpPr>
-        <p:spPr/>
-        <p:txBody>
-          <a:bodyPr/>
-          <a:lstStyle/>
-          <a:p>
-            <a:r>
-              <a:rPr lang="en-US" dirty="0"/>
-              <a:t>LFS-EDGE</a:t>
-            </a:r>
-          </a:p>
-        </p:txBody>
-      </p:sp>
-      <p:pic>
-        <p:nvPicPr>
-          <p:cNvPr id="9" name="Picture Placeholder 8" descr="mountains at sunset">
-            <a:extLst>
-              <a:ext uri="{FF2B5EF4-FFF2-40B4-BE49-F238E27FC236}">
-                <a16:creationId xmlns:a16="http://schemas.microsoft.com/office/drawing/2014/main" id="{C82DA925-978C-48A9-98AD-0653B7A3D2D9}"/>
-              </a:ext>
-            </a:extLst>
-          </p:cNvPr>
-          <p:cNvPicPr>
-            <a:picLocks noGrp="1" noChangeAspect="1"/>
-          </p:cNvPicPr>
-          <p:nvPr>
-            <p:ph type="pic" sz="quarter" idx="14"/>
-          </p:nvPr>
-        </p:nvPicPr>
-        <p:blipFill rotWithShape="1">
-          <a:blip r:embed="rId2"/>
-          <a:srcRect t="41" b="41"/>
-          <a:stretch/>
-        </p:blipFill>
-        <p:spPr/>
-      </p:pic>
-      <p:pic>
-        <p:nvPicPr>
-          <p:cNvPr id="11" name="Picture Placeholder 10" descr="mountains at sunset">
-            <a:extLst>
-              <a:ext uri="{FF2B5EF4-FFF2-40B4-BE49-F238E27FC236}">
-                <a16:creationId xmlns:a16="http://schemas.microsoft.com/office/drawing/2014/main" id="{E63B7C3F-04A4-43F6-881D-FA11061CBAFA}"/>
-              </a:ext>
-            </a:extLst>
-          </p:cNvPr>
-          <p:cNvPicPr>
-            <a:picLocks noGrp="1" noChangeAspect="1"/>
-          </p:cNvPicPr>
-          <p:nvPr>
-            <p:ph type="pic" sz="quarter" idx="15"/>
-          </p:nvPr>
-        </p:nvPicPr>
-        <p:blipFill rotWithShape="1">
-          <a:blip r:embed="rId3"/>
-          <a:srcRect t="347" b="347"/>
-          <a:stretch/>
-        </p:blipFill>
-        <p:spPr/>
-      </p:pic>
-      <p:sp>
-        <p:nvSpPr>
-          <p:cNvPr id="6" name="Title 5">
-            <a:extLst>
-              <a:ext uri="{FF2B5EF4-FFF2-40B4-BE49-F238E27FC236}">
-                <a16:creationId xmlns:a16="http://schemas.microsoft.com/office/drawing/2014/main" id="{FF777B66-94CB-491C-AC6B-BDAC98E21D57}"/>
+          <p:cNvPr id="2" name="Title 1">
+            <a:extLst>
+              <a:ext uri="{FF2B5EF4-FFF2-40B4-BE49-F238E27FC236}">
+                <a16:creationId xmlns:a16="http://schemas.microsoft.com/office/drawing/2014/main" id="{CFACDA59-55A0-4EA5-B3E4-646D1D3B4CEB}"/>
               </a:ext>
             </a:extLst>
           </p:cNvPr>
@@ -17875,22 +17935,25 @@
         </p:nvSpPr>
         <p:spPr/>
         <p:txBody>
-          <a:bodyPr/>
+          <a:bodyPr>
+            <a:normAutofit/>
+          </a:bodyPr>
           <a:lstStyle/>
           <a:p>
             <a:r>
               <a:rPr lang="en-US" dirty="0"/>
-              <a:t>Thank you</a:t>
-            </a:r>
-          </a:p>
-        </p:txBody>
-      </p:sp>
-      <p:sp>
-        <p:nvSpPr>
-          <p:cNvPr id="7" name="Text Placeholder 6">
-            <a:extLst>
-              <a:ext uri="{FF2B5EF4-FFF2-40B4-BE49-F238E27FC236}">
-                <a16:creationId xmlns:a16="http://schemas.microsoft.com/office/drawing/2014/main" id="{42AF1107-8D35-4E35-93C7-D3640946F742}"/>
+              <a:t>Go proverbs - quiz</a:t>
+            </a:r>
+            <a:endParaRPr lang="en-US" sz="5400" dirty="0"/>
+          </a:p>
+        </p:txBody>
+      </p:sp>
+      <p:sp>
+        <p:nvSpPr>
+          <p:cNvPr id="15" name="Content Placeholder 14">
+            <a:extLst>
+              <a:ext uri="{FF2B5EF4-FFF2-40B4-BE49-F238E27FC236}">
+                <a16:creationId xmlns:a16="http://schemas.microsoft.com/office/drawing/2014/main" id="{0DE4AC6A-3FAF-881B-86DE-A0BFC3B4250F}"/>
               </a:ext>
             </a:extLst>
           </p:cNvPr>
@@ -17898,77 +17961,140 @@
             <a:spLocks noGrp="1"/>
           </p:cNvSpPr>
           <p:nvPr>
-            <p:ph type="body" sz="quarter" idx="13"/>
+            <p:ph idx="1"/>
           </p:nvPr>
         </p:nvSpPr>
         <p:spPr/>
         <p:txBody>
-          <a:bodyPr/>
+          <a:bodyPr>
+            <a:normAutofit fontScale="85000" lnSpcReduction="20000"/>
+          </a:bodyPr>
           <a:lstStyle/>
           <a:p>
-            <a:r>
-              <a:rPr lang="en-US" dirty="0"/>
-              <a:t>Norbert Bondarczuk</a:t>
-            </a:r>
-          </a:p>
-          <a:p>
-            <a:r>
-              <a:rPr lang="en-US" dirty="0"/>
-              <a:t>Norbert.Bondarczuk@hp.com</a:t>
-            </a:r>
-          </a:p>
-        </p:txBody>
-      </p:sp>
-      <p:pic>
-        <p:nvPicPr>
-          <p:cNvPr id="15" name="Picture Placeholder 14" descr="mountains under near dusk sky">
-            <a:extLst>
-              <a:ext uri="{FF2B5EF4-FFF2-40B4-BE49-F238E27FC236}">
-                <a16:creationId xmlns:a16="http://schemas.microsoft.com/office/drawing/2014/main" id="{3D15FDC1-74B5-4FD8-BD17-0E2502C411A6}"/>
-              </a:ext>
-            </a:extLst>
-          </p:cNvPr>
-          <p:cNvPicPr>
-            <a:picLocks noGrp="1" noChangeAspect="1"/>
-          </p:cNvPicPr>
-          <p:nvPr>
-            <p:ph type="pic" sz="quarter" idx="17"/>
-          </p:nvPr>
-        </p:nvPicPr>
-        <p:blipFill rotWithShape="1">
-          <a:blip r:embed="rId4"/>
-          <a:srcRect l="16" r="16"/>
-          <a:stretch/>
-        </p:blipFill>
-        <p:spPr/>
-      </p:pic>
-      <p:pic>
-        <p:nvPicPr>
-          <p:cNvPr id="13" name="Picture Placeholder 12" descr="mountains under the night sky just before dawn">
-            <a:extLst>
-              <a:ext uri="{FF2B5EF4-FFF2-40B4-BE49-F238E27FC236}">
-                <a16:creationId xmlns:a16="http://schemas.microsoft.com/office/drawing/2014/main" id="{E02C4914-F076-4415-9C5D-A9BDB6CC6110}"/>
-              </a:ext>
-            </a:extLst>
-          </p:cNvPr>
-          <p:cNvPicPr>
-            <a:picLocks noGrp="1" noChangeAspect="1"/>
-          </p:cNvPicPr>
-          <p:nvPr>
-            <p:ph type="pic" sz="quarter" idx="16"/>
-          </p:nvPr>
-        </p:nvPicPr>
-        <p:blipFill rotWithShape="1">
-          <a:blip r:embed="rId5"/>
-          <a:srcRect t="108" b="108"/>
-          <a:stretch/>
-        </p:blipFill>
-        <p:spPr/>
-      </p:pic>
+            <a:pPr lvl="1"/>
+            <a:r>
+              <a:rPr lang="en-US" dirty="0"/>
+              <a:t>Errors are values.</a:t>
+            </a:r>
+          </a:p>
+          <a:p>
+            <a:pPr lvl="1"/>
+            <a:r>
+              <a:rPr lang="en-US" dirty="0"/>
+              <a:t>Don’t just check errors, handle them gracefully.</a:t>
+            </a:r>
+          </a:p>
+          <a:p>
+            <a:pPr lvl="1"/>
+            <a:r>
+              <a:rPr lang="en-US" dirty="0"/>
+              <a:t>Don’t panic.</a:t>
+            </a:r>
+          </a:p>
+          <a:p>
+            <a:pPr lvl="1"/>
+            <a:r>
+              <a:rPr lang="en-US" dirty="0"/>
+              <a:t>Make the zero value useful.</a:t>
+            </a:r>
+          </a:p>
+          <a:p>
+            <a:pPr lvl="1"/>
+            <a:r>
+              <a:rPr lang="en-US" dirty="0"/>
+              <a:t>The bigger the interface, the weaker the abstraction.</a:t>
+            </a:r>
+          </a:p>
+          <a:p>
+            <a:pPr lvl="1"/>
+            <a:r>
+              <a:rPr lang="en-US" dirty="0"/>
+              <a:t>interface{} says nothing.</a:t>
+            </a:r>
+          </a:p>
+          <a:p>
+            <a:pPr lvl="1"/>
+            <a:r>
+              <a:rPr lang="en-US" dirty="0" err="1"/>
+              <a:t>Gofmt’s</a:t>
+            </a:r>
+            <a:r>
+              <a:rPr lang="en-US" dirty="0"/>
+              <a:t> style is no one’s favorite, yet </a:t>
+            </a:r>
+            <a:r>
+              <a:rPr lang="en-US" dirty="0" err="1"/>
+              <a:t>gofmt</a:t>
+            </a:r>
+            <a:r>
+              <a:rPr lang="en-US" dirty="0"/>
+              <a:t> is everyone’s favorite.</a:t>
+            </a:r>
+          </a:p>
+          <a:p>
+            <a:pPr lvl="1"/>
+            <a:r>
+              <a:rPr lang="en-US" dirty="0"/>
+              <a:t>Documentation is for users.</a:t>
+            </a:r>
+          </a:p>
+          <a:p>
+            <a:pPr lvl="1"/>
+            <a:r>
+              <a:rPr lang="en-US" dirty="0"/>
+              <a:t>A little copying is better than a little dependency.</a:t>
+            </a:r>
+          </a:p>
+          <a:p>
+            <a:pPr lvl="1"/>
+            <a:r>
+              <a:rPr lang="en-US" dirty="0"/>
+              <a:t>Clear is better than clever.</a:t>
+            </a:r>
+          </a:p>
+          <a:p>
+            <a:pPr lvl="1"/>
+            <a:r>
+              <a:rPr lang="en-US" dirty="0"/>
+              <a:t>Concurrency is not parallelism.</a:t>
+            </a:r>
+          </a:p>
+          <a:p>
+            <a:pPr lvl="1"/>
+            <a:r>
+              <a:rPr lang="en-US" dirty="0"/>
+              <a:t>Don’t communicate by sharing memory, share memory by communicating.</a:t>
+            </a:r>
+          </a:p>
+          <a:p>
+            <a:pPr lvl="1"/>
+            <a:r>
+              <a:rPr lang="en-US" dirty="0"/>
+              <a:t>Channels orchestrate; mutexes serialize.</a:t>
+            </a:r>
+          </a:p>
+          <a:p>
+            <a:pPr lvl="1"/>
+            <a:endParaRPr lang="en-US" dirty="0"/>
+          </a:p>
+          <a:p>
+            <a:pPr marL="457200" lvl="1" indent="0">
+              <a:buNone/>
+            </a:pPr>
+            <a:r>
+              <a:rPr lang="en-US" dirty="0"/>
+              <a:t>Rob Pike, Go Proverbs (see go-proverbs.github.io)”</a:t>
+            </a:r>
+          </a:p>
+          <a:p>
+            <a:endParaRPr lang="en-US" dirty="0"/>
+          </a:p>
+        </p:txBody>
+      </p:sp>
     </p:spTree>
     <p:extLst>
       <p:ext uri="{BB962C8B-B14F-4D97-AF65-F5344CB8AC3E}">
-        <p14:creationId xmlns:p14="http://schemas.microsoft.com/office/powerpoint/2010/main" val="927313156"/>
+        <p14:creationId xmlns:p14="http://schemas.microsoft.com/office/powerpoint/2010/main" val="3184894582"/>
       </p:ext>
     </p:extLst>
   </p:cSld>
@@ -18044,7 +18170,7 @@
         <p:spPr>
           <a:xfrm>
             <a:off x="838200" y="1584124"/>
-            <a:ext cx="6221412" cy="2084361"/>
+            <a:ext cx="6221412" cy="4708726"/>
           </a:xfrm>
         </p:spPr>
         <p:txBody>
@@ -18068,6 +18194,48 @@
               <a:rPr lang="en-US" dirty="0"/>
               <a:t>, R. Pike, K. Thompson all working for Google (at the time).</a:t>
             </a:r>
+          </a:p>
+          <a:p>
+            <a:pPr marL="457200" lvl="1" indent="0">
+              <a:buNone/>
+            </a:pPr>
+            <a:endParaRPr lang="en-US" dirty="0"/>
+          </a:p>
+          <a:p>
+            <a:pPr marL="457200" lvl="1" indent="0">
+              <a:buNone/>
+            </a:pPr>
+            <a:endParaRPr lang="en-US" dirty="0"/>
+          </a:p>
+          <a:p>
+            <a:pPr marL="457200" lvl="1" indent="0">
+              <a:buNone/>
+            </a:pPr>
+            <a:endParaRPr lang="en-US" dirty="0"/>
+          </a:p>
+          <a:p>
+            <a:pPr marL="457200" lvl="1" indent="0">
+              <a:buNone/>
+            </a:pPr>
+            <a:endParaRPr lang="en-US" dirty="0"/>
+          </a:p>
+          <a:p>
+            <a:pPr marL="457200" lvl="1" indent="0">
+              <a:buNone/>
+            </a:pPr>
+            <a:endParaRPr lang="en-US" dirty="0"/>
+          </a:p>
+          <a:p>
+            <a:pPr marL="457200" lvl="1" indent="0">
+              <a:buNone/>
+            </a:pPr>
+            <a:endParaRPr lang="en-US" dirty="0"/>
+          </a:p>
+          <a:p>
+            <a:pPr marL="457200" lvl="1" indent="0">
+              <a:buNone/>
+            </a:pPr>
+            <a:endParaRPr lang="en-US" dirty="0"/>
           </a:p>
           <a:p>
             <a:pPr marL="457200" lvl="1" indent="0">
@@ -18149,7 +18317,7 @@
 </p:sld>
 </file>
 
-<file path=ppt/slides/slide5.xml><?xml version="1.0" encoding="utf-8"?>
+<file path=ppt/slides/slide40.xml><?xml version="1.0" encoding="utf-8"?>
 <p:sld xmlns:a="http://schemas.openxmlformats.org/drawingml/2006/main" xmlns:r="http://schemas.openxmlformats.org/officeDocument/2006/relationships" xmlns:p="http://schemas.openxmlformats.org/presentationml/2006/main">
   <p:cSld>
     <p:spTree>
@@ -18191,7 +18359,7 @@
           <a:p>
             <a:r>
               <a:rPr lang="en-US" dirty="0"/>
-              <a:t>What is this?</a:t>
+              <a:t>Code examples for workshop</a:t>
             </a:r>
             <a:endParaRPr lang="en-US" sz="5400" dirty="0"/>
           </a:p>
@@ -18213,99 +18381,53 @@
             <p:ph idx="1"/>
           </p:nvPr>
         </p:nvSpPr>
-        <p:spPr>
-          <a:xfrm>
-            <a:off x="736600" y="1794932"/>
-            <a:ext cx="10515600" cy="4504267"/>
-          </a:xfrm>
-        </p:spPr>
+        <p:spPr/>
         <p:txBody>
           <a:bodyPr>
             <a:normAutofit/>
           </a:bodyPr>
           <a:lstStyle/>
           <a:p>
-            <a:pPr marL="0" indent="0">
-              <a:buNone/>
-            </a:pPr>
-            <a:r>
-              <a:rPr lang="en-US" i="1" dirty="0"/>
-              <a:t>“Go is an open source programming language that makes it easy to build simple, reliable and efficient software”</a:t>
-            </a:r>
-            <a:r>
-              <a:rPr lang="en-US" dirty="0"/>
-              <a:t> (From the Go site at </a:t>
-            </a:r>
-            <a:r>
-              <a:rPr lang="en-US" dirty="0">
-                <a:latin typeface="Courier New" panose="02070309020205020404" pitchFamily="49" charset="0"/>
-                <a:cs typeface="Courier New" panose="02070309020205020404" pitchFamily="49" charset="0"/>
+            <a:r>
+              <a:rPr lang="en-US" dirty="0"/>
+              <a:t>Available at: </a:t>
+            </a:r>
+            <a:r>
+              <a:rPr lang="en-US" dirty="0" err="1">
+                <a:hlinkClick r:id="rId2"/>
               </a:rPr>
-              <a:t>golang.org</a:t>
-            </a:r>
-            <a:r>
-              <a:rPr lang="en-US" dirty="0"/>
-              <a:t>)</a:t>
-            </a:r>
-          </a:p>
-          <a:p>
-            <a:pPr marL="0" indent="0">
-              <a:buNone/>
-            </a:pPr>
-            <a:endParaRPr lang="en-US" dirty="0"/>
-          </a:p>
-          <a:p>
-            <a:pPr marL="457200" lvl="1" indent="0">
-              <a:buNone/>
-            </a:pPr>
+              <a:t>golang</a:t>
+            </a:r>
             <a:r>
               <a:rPr lang="en-US" dirty="0">
                 <a:hlinkClick r:id="rId2"/>
               </a:rPr>
-              <a:t>The Go Programming Language</a:t>
-            </a:r>
-            <a:endParaRPr lang="en-US" dirty="0"/>
-          </a:p>
-          <a:p>
-            <a:pPr marL="457200" lvl="1" indent="0">
-              <a:buNone/>
-            </a:pPr>
-            <a:endParaRPr lang="en-US" dirty="0"/>
-          </a:p>
-          <a:p>
-            <a:pPr marL="457200" lvl="1" indent="0">
-              <a:buNone/>
-            </a:pPr>
+              <a:t>-q-a/examples at main · </a:t>
+            </a:r>
+            <a:r>
+              <a:rPr lang="en-US" dirty="0" err="1">
+                <a:hlinkClick r:id="rId2"/>
+              </a:rPr>
+              <a:t>nbondarczuk</a:t>
+            </a:r>
             <a:r>
               <a:rPr lang="en-US" dirty="0">
-                <a:hlinkClick r:id="rId3"/>
+                <a:hlinkClick r:id="rId2"/>
               </a:rPr>
-              <a:t>Tutorial: Get started with Go - The Go Programming Language</a:t>
-            </a:r>
-            <a:endParaRPr lang="en-US" dirty="0"/>
-          </a:p>
-          <a:p>
-            <a:pPr marL="457200" lvl="1" indent="0">
-              <a:buNone/>
-            </a:pPr>
-            <a:endParaRPr lang="en-US" dirty="0"/>
-          </a:p>
-          <a:p>
-            <a:pPr marL="457200" lvl="1" indent="0">
-              <a:buNone/>
-            </a:pPr>
+              <a:t>/</a:t>
+            </a:r>
+            <a:r>
+              <a:rPr lang="en-US" dirty="0" err="1">
+                <a:hlinkClick r:id="rId2"/>
+              </a:rPr>
+              <a:t>golang</a:t>
+            </a:r>
             <a:r>
               <a:rPr lang="en-US" dirty="0">
-                <a:hlinkClick r:id="rId4"/>
+                <a:hlinkClick r:id="rId2"/>
               </a:rPr>
-              <a:t>Documentation - The Go Programming Language</a:t>
-            </a:r>
-            <a:endParaRPr lang="en-US" dirty="0"/>
-          </a:p>
-          <a:p>
-            <a:pPr marL="0" indent="0">
-              <a:buNone/>
-            </a:pPr>
+              <a:t>-q-a · GitHub</a:t>
+            </a:r>
             <a:endParaRPr lang="en-US" dirty="0"/>
           </a:p>
         </p:txBody>
@@ -18313,7 +18435,7 @@
     </p:spTree>
     <p:extLst>
       <p:ext uri="{BB962C8B-B14F-4D97-AF65-F5344CB8AC3E}">
-        <p14:creationId xmlns:p14="http://schemas.microsoft.com/office/powerpoint/2010/main" val="1979549358"/>
+        <p14:creationId xmlns:p14="http://schemas.microsoft.com/office/powerpoint/2010/main" val="3384533040"/>
       </p:ext>
     </p:extLst>
   </p:cSld>
@@ -18323,7 +18445,7 @@
 </p:sld>
 </file>
 
-<file path=ppt/slides/slide6.xml><?xml version="1.0" encoding="utf-8"?>
+<file path=ppt/slides/slide41.xml><?xml version="1.0" encoding="utf-8"?>
 <p:sld xmlns:a="http://schemas.openxmlformats.org/drawingml/2006/main" xmlns:r="http://schemas.openxmlformats.org/officeDocument/2006/relationships" xmlns:p="http://schemas.openxmlformats.org/presentationml/2006/main">
   <p:cSld>
     <p:spTree>
@@ -18342,10 +18464,142 @@
       </p:grpSpPr>
       <p:sp>
         <p:nvSpPr>
-          <p:cNvPr id="2" name="Title 1">
-            <a:extLst>
-              <a:ext uri="{FF2B5EF4-FFF2-40B4-BE49-F238E27FC236}">
-                <a16:creationId xmlns:a16="http://schemas.microsoft.com/office/drawing/2014/main" id="{CFACDA59-55A0-4EA5-B3E4-646D1D3B4CEB}"/>
+          <p:cNvPr id="22" name="Date Placeholder 21">
+            <a:extLst>
+              <a:ext uri="{FF2B5EF4-FFF2-40B4-BE49-F238E27FC236}">
+                <a16:creationId xmlns:a16="http://schemas.microsoft.com/office/drawing/2014/main" id="{692474E6-3035-46B8-9C05-9B4204E8ED39}"/>
+              </a:ext>
+            </a:extLst>
+          </p:cNvPr>
+          <p:cNvSpPr>
+            <a:spLocks noGrp="1"/>
+          </p:cNvSpPr>
+          <p:nvPr>
+            <p:ph type="dt" sz="half" idx="10"/>
+          </p:nvPr>
+        </p:nvSpPr>
+        <p:spPr/>
+        <p:txBody>
+          <a:bodyPr/>
+          <a:lstStyle/>
+          <a:p>
+            <a:r>
+              <a:rPr lang="en-US" dirty="0"/>
+              <a:t>28/2/2023</a:t>
+            </a:r>
+          </a:p>
+        </p:txBody>
+      </p:sp>
+      <p:sp>
+        <p:nvSpPr>
+          <p:cNvPr id="24" name="Slide Number Placeholder 23">
+            <a:extLst>
+              <a:ext uri="{FF2B5EF4-FFF2-40B4-BE49-F238E27FC236}">
+                <a16:creationId xmlns:a16="http://schemas.microsoft.com/office/drawing/2014/main" id="{5D838446-B95D-4AB7-B8CA-D5804BB79A11}"/>
+              </a:ext>
+            </a:extLst>
+          </p:cNvPr>
+          <p:cNvSpPr>
+            <a:spLocks noGrp="1"/>
+          </p:cNvSpPr>
+          <p:nvPr>
+            <p:ph type="sldNum" sz="quarter" idx="12"/>
+          </p:nvPr>
+        </p:nvSpPr>
+        <p:spPr/>
+        <p:txBody>
+          <a:bodyPr/>
+          <a:lstStyle/>
+          <a:p>
+            <a:fld id="{D8DA9DAA-006C-4F4B-980E-E3DF019B24E2}" type="slidenum">
+              <a:rPr lang="en-US" smtClean="0"/>
+              <a:pPr/>
+              <a:t>41</a:t>
+            </a:fld>
+            <a:endParaRPr lang="en-US" dirty="0"/>
+          </a:p>
+        </p:txBody>
+      </p:sp>
+      <p:sp>
+        <p:nvSpPr>
+          <p:cNvPr id="23" name="Footer Placeholder 22">
+            <a:extLst>
+              <a:ext uri="{FF2B5EF4-FFF2-40B4-BE49-F238E27FC236}">
+                <a16:creationId xmlns:a16="http://schemas.microsoft.com/office/drawing/2014/main" id="{DE8D546E-0F46-4CC0-B2B1-8B2430D00C0C}"/>
+              </a:ext>
+            </a:extLst>
+          </p:cNvPr>
+          <p:cNvSpPr>
+            <a:spLocks noGrp="1"/>
+          </p:cNvSpPr>
+          <p:nvPr>
+            <p:ph type="ftr" sz="quarter" idx="11"/>
+          </p:nvPr>
+        </p:nvSpPr>
+        <p:spPr/>
+        <p:txBody>
+          <a:bodyPr/>
+          <a:lstStyle/>
+          <a:p>
+            <a:r>
+              <a:rPr lang="en-US" dirty="0"/>
+              <a:t>LFS-EDGE</a:t>
+            </a:r>
+          </a:p>
+        </p:txBody>
+      </p:sp>
+      <p:pic>
+        <p:nvPicPr>
+          <p:cNvPr id="9" name="Picture Placeholder 8" descr="mountains at sunset">
+            <a:extLst>
+              <a:ext uri="{FF2B5EF4-FFF2-40B4-BE49-F238E27FC236}">
+                <a16:creationId xmlns:a16="http://schemas.microsoft.com/office/drawing/2014/main" id="{C82DA925-978C-48A9-98AD-0653B7A3D2D9}"/>
+              </a:ext>
+            </a:extLst>
+          </p:cNvPr>
+          <p:cNvPicPr>
+            <a:picLocks noGrp="1" noChangeAspect="1"/>
+          </p:cNvPicPr>
+          <p:nvPr>
+            <p:ph type="pic" sz="quarter" idx="14"/>
+          </p:nvPr>
+        </p:nvPicPr>
+        <p:blipFill rotWithShape="1">
+          <a:blip r:embed="rId2"/>
+          <a:srcRect t="41" b="41"/>
+          <a:stretch/>
+        </p:blipFill>
+        <p:spPr/>
+      </p:pic>
+      <p:pic>
+        <p:nvPicPr>
+          <p:cNvPr id="11" name="Picture Placeholder 10" descr="mountains at sunset">
+            <a:extLst>
+              <a:ext uri="{FF2B5EF4-FFF2-40B4-BE49-F238E27FC236}">
+                <a16:creationId xmlns:a16="http://schemas.microsoft.com/office/drawing/2014/main" id="{E63B7C3F-04A4-43F6-881D-FA11061CBAFA}"/>
+              </a:ext>
+            </a:extLst>
+          </p:cNvPr>
+          <p:cNvPicPr>
+            <a:picLocks noGrp="1" noChangeAspect="1"/>
+          </p:cNvPicPr>
+          <p:nvPr>
+            <p:ph type="pic" sz="quarter" idx="15"/>
+          </p:nvPr>
+        </p:nvPicPr>
+        <p:blipFill rotWithShape="1">
+          <a:blip r:embed="rId3"/>
+          <a:srcRect t="347" b="347"/>
+          <a:stretch/>
+        </p:blipFill>
+        <p:spPr/>
+      </p:pic>
+      <p:sp>
+        <p:nvSpPr>
+          <p:cNvPr id="6" name="Title 5">
+            <a:extLst>
+              <a:ext uri="{FF2B5EF4-FFF2-40B4-BE49-F238E27FC236}">
+                <a16:creationId xmlns:a16="http://schemas.microsoft.com/office/drawing/2014/main" id="{FF777B66-94CB-491C-AC6B-BDAC98E21D57}"/>
               </a:ext>
             </a:extLst>
           </p:cNvPr>
@@ -18358,25 +18612,22 @@
         </p:nvSpPr>
         <p:spPr/>
         <p:txBody>
-          <a:bodyPr>
-            <a:normAutofit/>
-          </a:bodyPr>
+          <a:bodyPr/>
           <a:lstStyle/>
           <a:p>
             <a:r>
               <a:rPr lang="en-US" dirty="0"/>
-              <a:t>What is it for?</a:t>
-            </a:r>
-            <a:endParaRPr lang="en-US" sz="5400" dirty="0"/>
-          </a:p>
-        </p:txBody>
-      </p:sp>
-      <p:sp>
-        <p:nvSpPr>
-          <p:cNvPr id="15" name="Content Placeholder 14">
-            <a:extLst>
-              <a:ext uri="{FF2B5EF4-FFF2-40B4-BE49-F238E27FC236}">
-                <a16:creationId xmlns:a16="http://schemas.microsoft.com/office/drawing/2014/main" id="{0DE4AC6A-3FAF-881B-86DE-A0BFC3B4250F}"/>
+              <a:t>Thank you</a:t>
+            </a:r>
+          </a:p>
+        </p:txBody>
+      </p:sp>
+      <p:sp>
+        <p:nvSpPr>
+          <p:cNvPr id="7" name="Text Placeholder 6">
+            <a:extLst>
+              <a:ext uri="{FF2B5EF4-FFF2-40B4-BE49-F238E27FC236}">
+                <a16:creationId xmlns:a16="http://schemas.microsoft.com/office/drawing/2014/main" id="{42AF1107-8D35-4E35-93C7-D3640946F742}"/>
               </a:ext>
             </a:extLst>
           </p:cNvPr>
@@ -18384,123 +18635,77 @@
             <a:spLocks noGrp="1"/>
           </p:cNvSpPr>
           <p:nvPr>
-            <p:ph idx="1"/>
+            <p:ph type="body" sz="quarter" idx="13"/>
           </p:nvPr>
         </p:nvSpPr>
         <p:spPr/>
         <p:txBody>
-          <a:bodyPr>
-            <a:normAutofit/>
-          </a:bodyPr>
+          <a:bodyPr/>
           <a:lstStyle/>
           <a:p>
-            <a:pPr lvl="1"/>
-            <a:r>
-              <a:rPr lang="en-US" dirty="0"/>
-              <a:t>It encourages integration of open-source projects as all resources are publicly available, mostly from </a:t>
-            </a:r>
-            <a:r>
-              <a:rPr lang="en-US" dirty="0" err="1"/>
-              <a:t>Github</a:t>
-            </a:r>
-            <a:r>
-              <a:rPr lang="en-US" dirty="0"/>
-              <a:t>.</a:t>
-            </a:r>
-          </a:p>
-          <a:p>
-            <a:pPr lvl="1"/>
-            <a:r>
-              <a:rPr lang="en-US" dirty="0"/>
-              <a:t>It has become popular as replacement for untyped scripting languages because </a:t>
-            </a:r>
-            <a:r>
-              <a:rPr lang="en-US" u="sng" dirty="0"/>
-              <a:t>it balances expressiveness with safety</a:t>
-            </a:r>
-            <a:r>
-              <a:rPr lang="en-US" dirty="0"/>
-              <a:t>.</a:t>
-            </a:r>
-          </a:p>
-          <a:p>
-            <a:pPr lvl="1"/>
-            <a:r>
-              <a:rPr lang="en-US" dirty="0"/>
-              <a:t>It is described as C for 21</a:t>
-            </a:r>
-            <a:r>
-              <a:rPr lang="en-US" baseline="30000" dirty="0"/>
-              <a:t>st</a:t>
-            </a:r>
-            <a:r>
-              <a:rPr lang="en-US" dirty="0"/>
-              <a:t> century.</a:t>
-            </a:r>
-          </a:p>
-          <a:p>
-            <a:pPr lvl="1"/>
-            <a:r>
-              <a:rPr lang="en-US" dirty="0"/>
-              <a:t>Some popular use cases are:</a:t>
-            </a:r>
-          </a:p>
-          <a:p>
-            <a:pPr lvl="2"/>
-            <a:r>
-              <a:rPr lang="en-US" dirty="0"/>
-              <a:t>Lower lever system programming (but not the lowest)</a:t>
-            </a:r>
-          </a:p>
-          <a:p>
-            <a:pPr lvl="2"/>
-            <a:r>
-              <a:rPr lang="en-US" dirty="0"/>
-              <a:t>Cloud systems (easy to embed in docker, Kubernetes)</a:t>
-            </a:r>
-          </a:p>
-          <a:p>
-            <a:pPr lvl="2"/>
-            <a:r>
-              <a:rPr lang="en-US" dirty="0"/>
-              <a:t>API design (rich standard library)</a:t>
-            </a:r>
-          </a:p>
-          <a:p>
-            <a:pPr lvl="2"/>
-            <a:r>
-              <a:rPr lang="en-US" dirty="0"/>
-              <a:t>Distributed systems (</a:t>
-            </a:r>
-            <a:r>
-              <a:rPr lang="en-US" dirty="0" err="1"/>
-              <a:t>gRPC</a:t>
-            </a:r>
-            <a:r>
-              <a:rPr lang="en-US" dirty="0"/>
-              <a:t>, REST)</a:t>
-            </a:r>
-          </a:p>
-          <a:p>
-            <a:pPr lvl="2"/>
-            <a:r>
-              <a:rPr lang="en-US" dirty="0"/>
-              <a:t>Low memory systems (low memory footprint, good locality of usage)</a:t>
-            </a:r>
-          </a:p>
-          <a:p>
-            <a:pPr lvl="2"/>
-            <a:r>
-              <a:rPr lang="en-US" dirty="0"/>
-              <a:t>Massively multiprocessor systems (cheap go-routine management)</a:t>
-            </a:r>
-          </a:p>
-        </p:txBody>
-      </p:sp>
+            <a:r>
+              <a:rPr lang="en-US" dirty="0"/>
+              <a:t>Norbert Bondarczuk</a:t>
+            </a:r>
+          </a:p>
+          <a:p>
+            <a:r>
+              <a:rPr lang="en-US" dirty="0"/>
+              <a:t>Norbert.Bondarczuk@hp.com</a:t>
+            </a:r>
+          </a:p>
+        </p:txBody>
+      </p:sp>
+      <p:pic>
+        <p:nvPicPr>
+          <p:cNvPr id="15" name="Picture Placeholder 14" descr="mountains under near dusk sky">
+            <a:extLst>
+              <a:ext uri="{FF2B5EF4-FFF2-40B4-BE49-F238E27FC236}">
+                <a16:creationId xmlns:a16="http://schemas.microsoft.com/office/drawing/2014/main" id="{3D15FDC1-74B5-4FD8-BD17-0E2502C411A6}"/>
+              </a:ext>
+            </a:extLst>
+          </p:cNvPr>
+          <p:cNvPicPr>
+            <a:picLocks noGrp="1" noChangeAspect="1"/>
+          </p:cNvPicPr>
+          <p:nvPr>
+            <p:ph type="pic" sz="quarter" idx="17"/>
+          </p:nvPr>
+        </p:nvPicPr>
+        <p:blipFill rotWithShape="1">
+          <a:blip r:embed="rId4"/>
+          <a:srcRect l="16" r="16"/>
+          <a:stretch/>
+        </p:blipFill>
+        <p:spPr/>
+      </p:pic>
+      <p:pic>
+        <p:nvPicPr>
+          <p:cNvPr id="13" name="Picture Placeholder 12" descr="mountains under the night sky just before dawn">
+            <a:extLst>
+              <a:ext uri="{FF2B5EF4-FFF2-40B4-BE49-F238E27FC236}">
+                <a16:creationId xmlns:a16="http://schemas.microsoft.com/office/drawing/2014/main" id="{E02C4914-F076-4415-9C5D-A9BDB6CC6110}"/>
+              </a:ext>
+            </a:extLst>
+          </p:cNvPr>
+          <p:cNvPicPr>
+            <a:picLocks noGrp="1" noChangeAspect="1"/>
+          </p:cNvPicPr>
+          <p:nvPr>
+            <p:ph type="pic" sz="quarter" idx="16"/>
+          </p:nvPr>
+        </p:nvPicPr>
+        <p:blipFill rotWithShape="1">
+          <a:blip r:embed="rId5"/>
+          <a:srcRect t="108" b="108"/>
+          <a:stretch/>
+        </p:blipFill>
+        <p:spPr/>
+      </p:pic>
     </p:spTree>
     <p:extLst>
       <p:ext uri="{BB962C8B-B14F-4D97-AF65-F5344CB8AC3E}">
-        <p14:creationId xmlns:p14="http://schemas.microsoft.com/office/powerpoint/2010/main" val="531954596"/>
+        <p14:creationId xmlns:p14="http://schemas.microsoft.com/office/powerpoint/2010/main" val="927313156"/>
       </p:ext>
     </p:extLst>
   </p:cSld>
@@ -18510,186 +18715,7 @@
 </p:sld>
 </file>
 
-<file path=ppt/slides/slide7.xml><?xml version="1.0" encoding="utf-8"?>
-<p:sld xmlns:a="http://schemas.openxmlformats.org/drawingml/2006/main" xmlns:r="http://schemas.openxmlformats.org/officeDocument/2006/relationships" xmlns:p="http://schemas.openxmlformats.org/presentationml/2006/main">
-  <p:cSld>
-    <p:spTree>
-      <p:nvGrpSpPr>
-        <p:cNvPr id="1" name=""/>
-        <p:cNvGrpSpPr/>
-        <p:nvPr/>
-      </p:nvGrpSpPr>
-      <p:grpSpPr>
-        <a:xfrm>
-          <a:off x="0" y="0"/>
-          <a:ext cx="0" cy="0"/>
-          <a:chOff x="0" y="0"/>
-          <a:chExt cx="0" cy="0"/>
-        </a:xfrm>
-      </p:grpSpPr>
-      <p:sp>
-        <p:nvSpPr>
-          <p:cNvPr id="2" name="Title 1">
-            <a:extLst>
-              <a:ext uri="{FF2B5EF4-FFF2-40B4-BE49-F238E27FC236}">
-                <a16:creationId xmlns:a16="http://schemas.microsoft.com/office/drawing/2014/main" id="{CFACDA59-55A0-4EA5-B3E4-646D1D3B4CEB}"/>
-              </a:ext>
-            </a:extLst>
-          </p:cNvPr>
-          <p:cNvSpPr>
-            <a:spLocks noGrp="1"/>
-          </p:cNvSpPr>
-          <p:nvPr>
-            <p:ph type="title"/>
-          </p:nvPr>
-        </p:nvSpPr>
-        <p:spPr/>
-        <p:txBody>
-          <a:bodyPr>
-            <a:normAutofit/>
-          </a:bodyPr>
-          <a:lstStyle/>
-          <a:p>
-            <a:r>
-              <a:rPr lang="en-US" dirty="0"/>
-              <a:t>Taxonomy</a:t>
-            </a:r>
-            <a:endParaRPr lang="en-US" sz="5400" dirty="0"/>
-          </a:p>
-        </p:txBody>
-      </p:sp>
-      <p:sp>
-        <p:nvSpPr>
-          <p:cNvPr id="15" name="Content Placeholder 14">
-            <a:extLst>
-              <a:ext uri="{FF2B5EF4-FFF2-40B4-BE49-F238E27FC236}">
-                <a16:creationId xmlns:a16="http://schemas.microsoft.com/office/drawing/2014/main" id="{0DE4AC6A-3FAF-881B-86DE-A0BFC3B4250F}"/>
-              </a:ext>
-            </a:extLst>
-          </p:cNvPr>
-          <p:cNvSpPr>
-            <a:spLocks noGrp="1"/>
-          </p:cNvSpPr>
-          <p:nvPr>
-            <p:ph idx="1"/>
-          </p:nvPr>
-        </p:nvSpPr>
-        <p:spPr/>
-        <p:txBody>
-          <a:bodyPr>
-            <a:normAutofit fontScale="85000" lnSpcReduction="20000"/>
-          </a:bodyPr>
-          <a:lstStyle/>
-          <a:p>
-            <a:pPr lvl="1"/>
-            <a:r>
-              <a:rPr lang="en-US" dirty="0"/>
-              <a:t>Golang comes from Pascal, Module, Oberon family of Algol-like languages.</a:t>
-            </a:r>
-          </a:p>
-          <a:p>
-            <a:pPr lvl="1"/>
-            <a:r>
-              <a:rPr lang="en-US" dirty="0"/>
-              <a:t>It is used as better C or slimmed down C++.</a:t>
-            </a:r>
-          </a:p>
-          <a:p>
-            <a:pPr lvl="1"/>
-            <a:r>
-              <a:rPr lang="en-US" dirty="0"/>
-              <a:t>Its compiler produces executable machine code which is different from Java or Python.</a:t>
-            </a:r>
-          </a:p>
-          <a:p>
-            <a:pPr lvl="1"/>
-            <a:r>
-              <a:rPr lang="en-US" dirty="0"/>
-              <a:t>It has objects and a sort of inheritance but no classes.</a:t>
-            </a:r>
-          </a:p>
-          <a:p>
-            <a:pPr lvl="1"/>
-            <a:r>
-              <a:rPr lang="en-US" dirty="0"/>
-              <a:t>It provides some recently popular features like “duck type” polymorphism, inheritance.</a:t>
-            </a:r>
-          </a:p>
-          <a:p>
-            <a:pPr lvl="1"/>
-            <a:r>
-              <a:rPr lang="en-US" dirty="0"/>
-              <a:t>It provides some super-features like CSP like channels and go-routines.</a:t>
-            </a:r>
-          </a:p>
-          <a:p>
-            <a:pPr lvl="1"/>
-            <a:r>
-              <a:rPr lang="en-US" dirty="0"/>
-              <a:t>It gives a lot in terms of development environment (go command).</a:t>
-            </a:r>
-          </a:p>
-          <a:p>
-            <a:pPr lvl="1"/>
-            <a:r>
-              <a:rPr lang="en-US" dirty="0"/>
-              <a:t>It encourages “</a:t>
-            </a:r>
-            <a:r>
-              <a:rPr lang="en-US" dirty="0" err="1"/>
-              <a:t>safe”or</a:t>
-            </a:r>
-            <a:r>
-              <a:rPr lang="en-US" dirty="0"/>
-              <a:t> defensive programming putting clarity over verbosity (short identifiers).</a:t>
-            </a:r>
-          </a:p>
-          <a:p>
-            <a:pPr lvl="1"/>
-            <a:r>
-              <a:rPr lang="en-US" dirty="0"/>
-              <a:t>Many features were made to write programs easily (no semicolons, no explicit memory management, no while loops, etc.).</a:t>
-            </a:r>
-          </a:p>
-          <a:p>
-            <a:pPr lvl="1"/>
-            <a:r>
-              <a:rPr lang="en-US" dirty="0"/>
-              <a:t>It is easy to learn, hard to master.</a:t>
-            </a:r>
-          </a:p>
-          <a:p>
-            <a:pPr lvl="1"/>
-            <a:r>
-              <a:rPr lang="en-US" dirty="0"/>
-              <a:t>Usually the good go code is well documented, written for the user to read.</a:t>
-            </a:r>
-          </a:p>
-          <a:p>
-            <a:pPr marL="457200" lvl="1" indent="0">
-              <a:buNone/>
-            </a:pPr>
-            <a:endParaRPr lang="en-US" dirty="0"/>
-          </a:p>
-          <a:p>
-            <a:endParaRPr lang="en-US" dirty="0"/>
-          </a:p>
-        </p:txBody>
-      </p:sp>
-    </p:spTree>
-    <p:extLst>
-      <p:ext uri="{BB962C8B-B14F-4D97-AF65-F5344CB8AC3E}">
-        <p14:creationId xmlns:p14="http://schemas.microsoft.com/office/powerpoint/2010/main" val="1089765631"/>
-      </p:ext>
-    </p:extLst>
-  </p:cSld>
-  <p:clrMapOvr>
-    <a:masterClrMapping/>
-  </p:clrMapOvr>
-</p:sld>
-</file>
-
-<file path=ppt/slides/slide8.xml><?xml version="1.0" encoding="utf-8"?>
+<file path=ppt/slides/slide5.xml><?xml version="1.0" encoding="utf-8"?>
 <p:sld xmlns:a="http://schemas.openxmlformats.org/drawingml/2006/main" xmlns:r="http://schemas.openxmlformats.org/officeDocument/2006/relationships" xmlns:p="http://schemas.openxmlformats.org/presentationml/2006/main">
   <p:cSld>
     <p:spTree>
@@ -18788,6 +18814,546 @@
     <p:extLst>
       <p:ext uri="{BB962C8B-B14F-4D97-AF65-F5344CB8AC3E}">
         <p14:creationId xmlns:p14="http://schemas.microsoft.com/office/powerpoint/2010/main" val="1682619705"/>
+      </p:ext>
+    </p:extLst>
+  </p:cSld>
+  <p:clrMapOvr>
+    <a:masterClrMapping/>
+  </p:clrMapOvr>
+</p:sld>
+</file>
+
+<file path=ppt/slides/slide6.xml><?xml version="1.0" encoding="utf-8"?>
+<p:sld xmlns:a="http://schemas.openxmlformats.org/drawingml/2006/main" xmlns:r="http://schemas.openxmlformats.org/officeDocument/2006/relationships" xmlns:p="http://schemas.openxmlformats.org/presentationml/2006/main">
+  <p:cSld>
+    <p:spTree>
+      <p:nvGrpSpPr>
+        <p:cNvPr id="1" name=""/>
+        <p:cNvGrpSpPr/>
+        <p:nvPr/>
+      </p:nvGrpSpPr>
+      <p:grpSpPr>
+        <a:xfrm>
+          <a:off x="0" y="0"/>
+          <a:ext cx="0" cy="0"/>
+          <a:chOff x="0" y="0"/>
+          <a:chExt cx="0" cy="0"/>
+        </a:xfrm>
+      </p:grpSpPr>
+      <p:sp>
+        <p:nvSpPr>
+          <p:cNvPr id="2" name="Title 1">
+            <a:extLst>
+              <a:ext uri="{FF2B5EF4-FFF2-40B4-BE49-F238E27FC236}">
+                <a16:creationId xmlns:a16="http://schemas.microsoft.com/office/drawing/2014/main" id="{CFACDA59-55A0-4EA5-B3E4-646D1D3B4CEB}"/>
+              </a:ext>
+            </a:extLst>
+          </p:cNvPr>
+          <p:cNvSpPr>
+            <a:spLocks noGrp="1"/>
+          </p:cNvSpPr>
+          <p:nvPr>
+            <p:ph type="title"/>
+          </p:nvPr>
+        </p:nvSpPr>
+        <p:spPr/>
+        <p:txBody>
+          <a:bodyPr>
+            <a:normAutofit/>
+          </a:bodyPr>
+          <a:lstStyle/>
+          <a:p>
+            <a:r>
+              <a:rPr lang="en-US" dirty="0"/>
+              <a:t>What is this?</a:t>
+            </a:r>
+            <a:endParaRPr lang="en-US" sz="5400" dirty="0"/>
+          </a:p>
+        </p:txBody>
+      </p:sp>
+      <p:sp>
+        <p:nvSpPr>
+          <p:cNvPr id="15" name="Content Placeholder 14">
+            <a:extLst>
+              <a:ext uri="{FF2B5EF4-FFF2-40B4-BE49-F238E27FC236}">
+                <a16:creationId xmlns:a16="http://schemas.microsoft.com/office/drawing/2014/main" id="{0DE4AC6A-3FAF-881B-86DE-A0BFC3B4250F}"/>
+              </a:ext>
+            </a:extLst>
+          </p:cNvPr>
+          <p:cNvSpPr>
+            <a:spLocks noGrp="1"/>
+          </p:cNvSpPr>
+          <p:nvPr>
+            <p:ph idx="1"/>
+          </p:nvPr>
+        </p:nvSpPr>
+        <p:spPr>
+          <a:xfrm>
+            <a:off x="736600" y="1794932"/>
+            <a:ext cx="10515600" cy="4504267"/>
+          </a:xfrm>
+        </p:spPr>
+        <p:txBody>
+          <a:bodyPr>
+            <a:normAutofit/>
+          </a:bodyPr>
+          <a:lstStyle/>
+          <a:p>
+            <a:pPr marL="0" indent="0">
+              <a:buNone/>
+            </a:pPr>
+            <a:r>
+              <a:rPr lang="en-US" i="1" dirty="0"/>
+              <a:t>“Go is an open source programming language that makes it easy to build simple, reliable and efficient software”</a:t>
+            </a:r>
+            <a:r>
+              <a:rPr lang="en-US" dirty="0"/>
+              <a:t> (From the Go site at </a:t>
+            </a:r>
+            <a:r>
+              <a:rPr lang="en-US" dirty="0">
+                <a:latin typeface="Courier New" panose="02070309020205020404" pitchFamily="49" charset="0"/>
+                <a:cs typeface="Courier New" panose="02070309020205020404" pitchFamily="49" charset="0"/>
+              </a:rPr>
+              <a:t>golang.org</a:t>
+            </a:r>
+            <a:r>
+              <a:rPr lang="en-US" dirty="0"/>
+              <a:t>)</a:t>
+            </a:r>
+          </a:p>
+          <a:p>
+            <a:pPr marL="0" indent="0">
+              <a:buNone/>
+            </a:pPr>
+            <a:endParaRPr lang="en-US" dirty="0"/>
+          </a:p>
+          <a:p>
+            <a:pPr marL="457200" lvl="1" indent="0">
+              <a:buNone/>
+            </a:pPr>
+            <a:r>
+              <a:rPr lang="en-US" dirty="0">
+                <a:hlinkClick r:id="rId2"/>
+              </a:rPr>
+              <a:t>The Go Programming Language</a:t>
+            </a:r>
+            <a:endParaRPr lang="en-US" dirty="0"/>
+          </a:p>
+          <a:p>
+            <a:pPr marL="457200" lvl="1" indent="0">
+              <a:buNone/>
+            </a:pPr>
+            <a:endParaRPr lang="en-US" dirty="0"/>
+          </a:p>
+          <a:p>
+            <a:pPr marL="457200" lvl="1" indent="0">
+              <a:buNone/>
+            </a:pPr>
+            <a:r>
+              <a:rPr lang="en-US" dirty="0">
+                <a:hlinkClick r:id="rId3"/>
+              </a:rPr>
+              <a:t>Tutorial: Get started with Go - The Go Programming Language</a:t>
+            </a:r>
+            <a:endParaRPr lang="en-US" dirty="0"/>
+          </a:p>
+          <a:p>
+            <a:pPr marL="457200" lvl="1" indent="0">
+              <a:buNone/>
+            </a:pPr>
+            <a:endParaRPr lang="en-US" dirty="0"/>
+          </a:p>
+          <a:p>
+            <a:pPr marL="457200" lvl="1" indent="0">
+              <a:buNone/>
+            </a:pPr>
+            <a:r>
+              <a:rPr lang="en-US" dirty="0">
+                <a:hlinkClick r:id="rId4"/>
+              </a:rPr>
+              <a:t>Documentation - The Go Programming Language</a:t>
+            </a:r>
+            <a:endParaRPr lang="en-US" dirty="0"/>
+          </a:p>
+          <a:p>
+            <a:pPr marL="0" indent="0">
+              <a:buNone/>
+            </a:pPr>
+            <a:endParaRPr lang="en-US" dirty="0"/>
+          </a:p>
+        </p:txBody>
+      </p:sp>
+    </p:spTree>
+    <p:extLst>
+      <p:ext uri="{BB962C8B-B14F-4D97-AF65-F5344CB8AC3E}">
+        <p14:creationId xmlns:p14="http://schemas.microsoft.com/office/powerpoint/2010/main" val="1979549358"/>
+      </p:ext>
+    </p:extLst>
+  </p:cSld>
+  <p:clrMapOvr>
+    <a:masterClrMapping/>
+  </p:clrMapOvr>
+</p:sld>
+</file>
+
+<file path=ppt/slides/slide7.xml><?xml version="1.0" encoding="utf-8"?>
+<p:sld xmlns:a="http://schemas.openxmlformats.org/drawingml/2006/main" xmlns:r="http://schemas.openxmlformats.org/officeDocument/2006/relationships" xmlns:p="http://schemas.openxmlformats.org/presentationml/2006/main">
+  <p:cSld>
+    <p:spTree>
+      <p:nvGrpSpPr>
+        <p:cNvPr id="1" name=""/>
+        <p:cNvGrpSpPr/>
+        <p:nvPr/>
+      </p:nvGrpSpPr>
+      <p:grpSpPr>
+        <a:xfrm>
+          <a:off x="0" y="0"/>
+          <a:ext cx="0" cy="0"/>
+          <a:chOff x="0" y="0"/>
+          <a:chExt cx="0" cy="0"/>
+        </a:xfrm>
+      </p:grpSpPr>
+      <p:sp>
+        <p:nvSpPr>
+          <p:cNvPr id="2" name="Title 1">
+            <a:extLst>
+              <a:ext uri="{FF2B5EF4-FFF2-40B4-BE49-F238E27FC236}">
+                <a16:creationId xmlns:a16="http://schemas.microsoft.com/office/drawing/2014/main" id="{CFACDA59-55A0-4EA5-B3E4-646D1D3B4CEB}"/>
+              </a:ext>
+            </a:extLst>
+          </p:cNvPr>
+          <p:cNvSpPr>
+            <a:spLocks noGrp="1"/>
+          </p:cNvSpPr>
+          <p:nvPr>
+            <p:ph type="title"/>
+          </p:nvPr>
+        </p:nvSpPr>
+        <p:spPr/>
+        <p:txBody>
+          <a:bodyPr>
+            <a:normAutofit/>
+          </a:bodyPr>
+          <a:lstStyle/>
+          <a:p>
+            <a:r>
+              <a:rPr lang="en-US" dirty="0"/>
+              <a:t>What is it for?</a:t>
+            </a:r>
+            <a:endParaRPr lang="en-US" sz="5400" dirty="0"/>
+          </a:p>
+        </p:txBody>
+      </p:sp>
+      <p:sp>
+        <p:nvSpPr>
+          <p:cNvPr id="15" name="Content Placeholder 14">
+            <a:extLst>
+              <a:ext uri="{FF2B5EF4-FFF2-40B4-BE49-F238E27FC236}">
+                <a16:creationId xmlns:a16="http://schemas.microsoft.com/office/drawing/2014/main" id="{0DE4AC6A-3FAF-881B-86DE-A0BFC3B4250F}"/>
+              </a:ext>
+            </a:extLst>
+          </p:cNvPr>
+          <p:cNvSpPr>
+            <a:spLocks noGrp="1"/>
+          </p:cNvSpPr>
+          <p:nvPr>
+            <p:ph idx="1"/>
+          </p:nvPr>
+        </p:nvSpPr>
+        <p:spPr/>
+        <p:txBody>
+          <a:bodyPr>
+            <a:normAutofit/>
+          </a:bodyPr>
+          <a:lstStyle/>
+          <a:p>
+            <a:pPr lvl="1"/>
+            <a:r>
+              <a:rPr lang="en-US" dirty="0"/>
+              <a:t>It encourages integration of open-source projects as all resources are publicly available, mostly from </a:t>
+            </a:r>
+            <a:r>
+              <a:rPr lang="en-US" dirty="0" err="1"/>
+              <a:t>Github</a:t>
+            </a:r>
+            <a:r>
+              <a:rPr lang="en-US" dirty="0"/>
+              <a:t>.</a:t>
+            </a:r>
+          </a:p>
+          <a:p>
+            <a:pPr lvl="1"/>
+            <a:r>
+              <a:rPr lang="en-US" dirty="0"/>
+              <a:t>It has become popular as replacement for untyped scripting languages because </a:t>
+            </a:r>
+            <a:r>
+              <a:rPr lang="en-US" u="sng" dirty="0"/>
+              <a:t>it balances expressiveness with safety</a:t>
+            </a:r>
+            <a:r>
+              <a:rPr lang="en-US" dirty="0"/>
+              <a:t>.</a:t>
+            </a:r>
+          </a:p>
+          <a:p>
+            <a:pPr lvl="1"/>
+            <a:r>
+              <a:rPr lang="en-US" dirty="0"/>
+              <a:t>It is described as C for 21</a:t>
+            </a:r>
+            <a:r>
+              <a:rPr lang="en-US" baseline="30000" dirty="0"/>
+              <a:t>st</a:t>
+            </a:r>
+            <a:r>
+              <a:rPr lang="en-US" dirty="0"/>
+              <a:t> century.</a:t>
+            </a:r>
+          </a:p>
+          <a:p>
+            <a:pPr lvl="1"/>
+            <a:r>
+              <a:rPr lang="en-US" dirty="0"/>
+              <a:t>Some popular use cases are:</a:t>
+            </a:r>
+          </a:p>
+          <a:p>
+            <a:pPr lvl="2"/>
+            <a:r>
+              <a:rPr lang="en-US" dirty="0"/>
+              <a:t>Lower lever system programming (but not the lowest)</a:t>
+            </a:r>
+          </a:p>
+          <a:p>
+            <a:pPr lvl="2"/>
+            <a:r>
+              <a:rPr lang="en-US" dirty="0"/>
+              <a:t>Cloud systems (easy to embed in docker, Kubernetes)</a:t>
+            </a:r>
+          </a:p>
+          <a:p>
+            <a:pPr lvl="2"/>
+            <a:r>
+              <a:rPr lang="en-US" dirty="0"/>
+              <a:t>API design (rich standard library)</a:t>
+            </a:r>
+          </a:p>
+          <a:p>
+            <a:pPr lvl="2"/>
+            <a:r>
+              <a:rPr lang="en-US" dirty="0"/>
+              <a:t>Distributed systems (</a:t>
+            </a:r>
+            <a:r>
+              <a:rPr lang="en-US" dirty="0" err="1"/>
+              <a:t>gRPC</a:t>
+            </a:r>
+            <a:r>
+              <a:rPr lang="en-US" dirty="0"/>
+              <a:t>, REST)</a:t>
+            </a:r>
+          </a:p>
+          <a:p>
+            <a:pPr lvl="2"/>
+            <a:r>
+              <a:rPr lang="en-US" dirty="0"/>
+              <a:t>Low memory systems (low memory footprint, good locality of usage)</a:t>
+            </a:r>
+          </a:p>
+          <a:p>
+            <a:pPr lvl="2"/>
+            <a:r>
+              <a:rPr lang="en-US" dirty="0"/>
+              <a:t>Massively multiprocessor systems (cheap go-routine management)</a:t>
+            </a:r>
+          </a:p>
+        </p:txBody>
+      </p:sp>
+    </p:spTree>
+    <p:extLst>
+      <p:ext uri="{BB962C8B-B14F-4D97-AF65-F5344CB8AC3E}">
+        <p14:creationId xmlns:p14="http://schemas.microsoft.com/office/powerpoint/2010/main" val="531954596"/>
+      </p:ext>
+    </p:extLst>
+  </p:cSld>
+  <p:clrMapOvr>
+    <a:masterClrMapping/>
+  </p:clrMapOvr>
+</p:sld>
+</file>
+
+<file path=ppt/slides/slide8.xml><?xml version="1.0" encoding="utf-8"?>
+<p:sld xmlns:a="http://schemas.openxmlformats.org/drawingml/2006/main" xmlns:r="http://schemas.openxmlformats.org/officeDocument/2006/relationships" xmlns:p="http://schemas.openxmlformats.org/presentationml/2006/main">
+  <p:cSld>
+    <p:spTree>
+      <p:nvGrpSpPr>
+        <p:cNvPr id="1" name=""/>
+        <p:cNvGrpSpPr/>
+        <p:nvPr/>
+      </p:nvGrpSpPr>
+      <p:grpSpPr>
+        <a:xfrm>
+          <a:off x="0" y="0"/>
+          <a:ext cx="0" cy="0"/>
+          <a:chOff x="0" y="0"/>
+          <a:chExt cx="0" cy="0"/>
+        </a:xfrm>
+      </p:grpSpPr>
+      <p:sp>
+        <p:nvSpPr>
+          <p:cNvPr id="2" name="Title 1">
+            <a:extLst>
+              <a:ext uri="{FF2B5EF4-FFF2-40B4-BE49-F238E27FC236}">
+                <a16:creationId xmlns:a16="http://schemas.microsoft.com/office/drawing/2014/main" id="{CFACDA59-55A0-4EA5-B3E4-646D1D3B4CEB}"/>
+              </a:ext>
+            </a:extLst>
+          </p:cNvPr>
+          <p:cNvSpPr>
+            <a:spLocks noGrp="1"/>
+          </p:cNvSpPr>
+          <p:nvPr>
+            <p:ph type="title"/>
+          </p:nvPr>
+        </p:nvSpPr>
+        <p:spPr/>
+        <p:txBody>
+          <a:bodyPr>
+            <a:normAutofit/>
+          </a:bodyPr>
+          <a:lstStyle/>
+          <a:p>
+            <a:r>
+              <a:rPr lang="en-US" dirty="0"/>
+              <a:t>Taxonomy</a:t>
+            </a:r>
+            <a:endParaRPr lang="en-US" sz="5400" dirty="0"/>
+          </a:p>
+        </p:txBody>
+      </p:sp>
+      <p:sp>
+        <p:nvSpPr>
+          <p:cNvPr id="15" name="Content Placeholder 14">
+            <a:extLst>
+              <a:ext uri="{FF2B5EF4-FFF2-40B4-BE49-F238E27FC236}">
+                <a16:creationId xmlns:a16="http://schemas.microsoft.com/office/drawing/2014/main" id="{0DE4AC6A-3FAF-881B-86DE-A0BFC3B4250F}"/>
+              </a:ext>
+            </a:extLst>
+          </p:cNvPr>
+          <p:cNvSpPr>
+            <a:spLocks noGrp="1"/>
+          </p:cNvSpPr>
+          <p:nvPr>
+            <p:ph idx="1"/>
+          </p:nvPr>
+        </p:nvSpPr>
+        <p:spPr/>
+        <p:txBody>
+          <a:bodyPr>
+            <a:normAutofit fontScale="85000" lnSpcReduction="20000"/>
+          </a:bodyPr>
+          <a:lstStyle/>
+          <a:p>
+            <a:pPr lvl="1"/>
+            <a:r>
+              <a:rPr lang="en-US" dirty="0"/>
+              <a:t>Golang comes from Pascal, Module, Oberon family of Algol-like languages.</a:t>
+            </a:r>
+          </a:p>
+          <a:p>
+            <a:pPr lvl="1"/>
+            <a:r>
+              <a:rPr lang="en-US" dirty="0"/>
+              <a:t>It is used as better C or slimmed down C++.</a:t>
+            </a:r>
+          </a:p>
+          <a:p>
+            <a:pPr lvl="1"/>
+            <a:r>
+              <a:rPr lang="en-US" dirty="0"/>
+              <a:t>Its compiler produces executable machine code which is different from Java or Python.</a:t>
+            </a:r>
+          </a:p>
+          <a:p>
+            <a:pPr lvl="1"/>
+            <a:r>
+              <a:rPr lang="en-US" dirty="0"/>
+              <a:t>It has objects and a sort of inheritance but no classes.</a:t>
+            </a:r>
+          </a:p>
+          <a:p>
+            <a:pPr lvl="1"/>
+            <a:r>
+              <a:rPr lang="en-US" dirty="0"/>
+              <a:t>It provides some recently popular features like “duck type” polymorphism, inheritance.</a:t>
+            </a:r>
+          </a:p>
+          <a:p>
+            <a:pPr lvl="1"/>
+            <a:r>
+              <a:rPr lang="en-US" dirty="0"/>
+              <a:t>It provides some super-features like CSP like channels and go-routines.</a:t>
+            </a:r>
+          </a:p>
+          <a:p>
+            <a:pPr lvl="1"/>
+            <a:r>
+              <a:rPr lang="en-US" dirty="0"/>
+              <a:t>It gives a lot in terms of development environment (go command).</a:t>
+            </a:r>
+          </a:p>
+          <a:p>
+            <a:pPr lvl="1"/>
+            <a:r>
+              <a:rPr lang="en-US" dirty="0"/>
+              <a:t>It encourages “</a:t>
+            </a:r>
+            <a:r>
+              <a:rPr lang="en-US" dirty="0" err="1"/>
+              <a:t>safe”or</a:t>
+            </a:r>
+            <a:r>
+              <a:rPr lang="en-US" dirty="0"/>
+              <a:t> defensive programming putting clarity over verbosity (short identifiers).</a:t>
+            </a:r>
+          </a:p>
+          <a:p>
+            <a:pPr lvl="1"/>
+            <a:r>
+              <a:rPr lang="en-US" dirty="0"/>
+              <a:t>Many features were made to write programs easily (no semicolons, no explicit memory management, no while loops, etc.).</a:t>
+            </a:r>
+          </a:p>
+          <a:p>
+            <a:pPr lvl="1"/>
+            <a:r>
+              <a:rPr lang="en-US" dirty="0"/>
+              <a:t>It is easy to learn, hard to master.</a:t>
+            </a:r>
+          </a:p>
+          <a:p>
+            <a:pPr lvl="1"/>
+            <a:r>
+              <a:rPr lang="en-US" dirty="0"/>
+              <a:t>Usually the good go code is well documented, written for the user to read.</a:t>
+            </a:r>
+          </a:p>
+          <a:p>
+            <a:pPr marL="457200" lvl="1" indent="0">
+              <a:buNone/>
+            </a:pPr>
+            <a:endParaRPr lang="en-US" dirty="0"/>
+          </a:p>
+          <a:p>
+            <a:endParaRPr lang="en-US" dirty="0"/>
+          </a:p>
+        </p:txBody>
+      </p:sp>
+    </p:spTree>
+    <p:extLst>
+      <p:ext uri="{BB962C8B-B14F-4D97-AF65-F5344CB8AC3E}">
+        <p14:creationId xmlns:p14="http://schemas.microsoft.com/office/powerpoint/2010/main" val="1089765631"/>
       </p:ext>
     </p:extLst>
   </p:cSld>
@@ -19451,15 +20017,6 @@
 </file>
 
 <file path=customXml/item1.xml><?xml version="1.0" encoding="utf-8"?>
-<?mso-contentType ?>
-<FormTemplates xmlns="http://schemas.microsoft.com/sharepoint/v3/contenttype/forms">
-  <Display>DocumentLibraryForm</Display>
-  <Edit>DocumentLibraryForm</Edit>
-  <New>DocumentLibraryForm</New>
-</FormTemplates>
-</file>
-
-<file path=customXml/item2.xml><?xml version="1.0" encoding="utf-8"?>
 <p:properties xmlns:p="http://schemas.microsoft.com/office/2006/metadata/properties" xmlns:xsi="http://www.w3.org/2001/XMLSchema-instance" xmlns:pc="http://schemas.microsoft.com/office/infopath/2007/PartnerControls">
   <documentManagement>
     <Status xmlns="71af3243-3dd4-4a8d-8c0d-dd76da1f02a5">Not started</Status>
@@ -19468,7 +20025,7 @@
 </p:properties>
 </file>
 
-<file path=customXml/item3.xml><?xml version="1.0" encoding="utf-8"?>
+<file path=customXml/item2.xml><?xml version="1.0" encoding="utf-8"?>
 <ct:contentTypeSchema xmlns:ct="http://schemas.microsoft.com/office/2006/metadata/contentType" xmlns:ma="http://schemas.microsoft.com/office/2006/metadata/properties/metaAttributes" ct:_="" ma:_="" ma:contentTypeName="Document" ma:contentTypeID="0x01010079F111ED35F8CC479449609E8A0923A6" ma:contentTypeVersion="12" ma:contentTypeDescription="Create a new document." ma:contentTypeScope="" ma:versionID="426e97fa315356fffbdcd9876fe988c2">
   <xsd:schema xmlns:xsd="http://www.w3.org/2001/XMLSchema" xmlns:xs="http://www.w3.org/2001/XMLSchema" xmlns:p="http://schemas.microsoft.com/office/2006/metadata/properties" xmlns:ns2="71af3243-3dd4-4a8d-8c0d-dd76da1f02a5" xmlns:ns3="16c05727-aa75-4e4a-9b5f-8a80a1165891" targetNamespace="http://schemas.microsoft.com/office/2006/metadata/properties" ma:root="true" ma:fieldsID="14b8f0def80e6d70ce3def20c90759ae" ns2:_="" ns3:_="">
     <xsd:import namespace="71af3243-3dd4-4a8d-8c0d-dd76da1f02a5"/>
@@ -19689,15 +20246,16 @@
 </ct:contentTypeSchema>
 </file>
 
-<file path=customXml/itemProps1.xml><?xml version="1.0" encoding="utf-8"?>
-<ds:datastoreItem xmlns:ds="http://schemas.openxmlformats.org/officeDocument/2006/customXml" ds:itemID="{3C8E00D1-8EA3-4E42-801D-0253E1EAFC21}">
-  <ds:schemaRefs>
-    <ds:schemaRef ds:uri="http://schemas.microsoft.com/sharepoint/v3/contenttype/forms"/>
-  </ds:schemaRefs>
-</ds:datastoreItem>
+<file path=customXml/item3.xml><?xml version="1.0" encoding="utf-8"?>
+<?mso-contentType ?>
+<FormTemplates xmlns="http://schemas.microsoft.com/sharepoint/v3/contenttype/forms">
+  <Display>DocumentLibraryForm</Display>
+  <Edit>DocumentLibraryForm</Edit>
+  <New>DocumentLibraryForm</New>
+</FormTemplates>
 </file>
 
-<file path=customXml/itemProps2.xml><?xml version="1.0" encoding="utf-8"?>
+<file path=customXml/itemProps1.xml><?xml version="1.0" encoding="utf-8"?>
 <ds:datastoreItem xmlns:ds="http://schemas.openxmlformats.org/officeDocument/2006/customXml" ds:itemID="{99919F73-B6C2-4A43-95E2-833EC48925FE}">
   <ds:schemaRefs>
     <ds:schemaRef ds:uri="http://schemas.openxmlformats.org/package/2006/metadata/core-properties"/>
@@ -19714,7 +20272,7 @@
 </ds:datastoreItem>
 </file>
 
-<file path=customXml/itemProps3.xml><?xml version="1.0" encoding="utf-8"?>
+<file path=customXml/itemProps2.xml><?xml version="1.0" encoding="utf-8"?>
 <ds:datastoreItem xmlns:ds="http://schemas.openxmlformats.org/officeDocument/2006/customXml" ds:itemID="{ABC329F5-30EE-4BF7-AA2A-B837B51416B4}">
   <ds:schemaRefs>
     <ds:schemaRef ds:uri="http://schemas.microsoft.com/office/2006/metadata/contentType"/>
@@ -19731,4 +20289,12 @@
     <ds:schemaRef ds:uri="http://schemas.microsoft.com/internal/obd"/>
   </ds:schemaRefs>
 </ds:datastoreItem>
+</file>
+
+<file path=customXml/itemProps3.xml><?xml version="1.0" encoding="utf-8"?>
+<ds:datastoreItem xmlns:ds="http://schemas.openxmlformats.org/officeDocument/2006/customXml" ds:itemID="{3C8E00D1-8EA3-4E42-801D-0253E1EAFC21}">
+  <ds:schemaRefs>
+    <ds:schemaRef ds:uri="http://schemas.microsoft.com/sharepoint/v3/contenttype/forms"/>
+  </ds:schemaRefs>
+</ds:datastoreItem>
 </file>
</xml_diff>